<commit_message>
Almost finalized project presentation (also now with pictures)
</commit_message>
<xml_diff>
--- a/Project Presentation.pptx
+++ b/Project Presentation.pptx
@@ -11,7 +11,7 @@
     <p:sldId id="256" r:id="rId2"/>
     <p:sldId id="257" r:id="rId3"/>
     <p:sldId id="258" r:id="rId4"/>
-    <p:sldId id="259" r:id="rId5"/>
+    <p:sldId id="261" r:id="rId5"/>
     <p:sldId id="260" r:id="rId6"/>
   </p:sldIdLst>
   <p:sldSz cx="12192000" cy="6858000"/>
@@ -201,7 +201,7 @@
           <a:p>
             <a:fld id="{A4D92528-8F91-4702-9CE2-747064616D0F}" type="datetimeFigureOut">
               <a:rPr lang="en-US" smtClean="0"/>
-              <a:t>11/28/2022</a:t>
+              <a:t>11/29/2022</a:t>
             </a:fld>
             <a:endParaRPr lang="en-US"/>
           </a:p>
@@ -512,7 +512,10 @@
           <a:bodyPr/>
           <a:lstStyle/>
           <a:p>
-            <a:endParaRPr lang="en-US" dirty="0"/>
+            <a:r>
+              <a:rPr lang="en-US" dirty="0"/>
+              <a:t>Addie</a:t>
+            </a:r>
           </a:p>
         </p:txBody>
       </p:sp>
@@ -543,6 +546,354 @@
     <p:extLst>
       <p:ext uri="{BB962C8B-B14F-4D97-AF65-F5344CB8AC3E}">
         <p14:creationId xmlns:p14="http://schemas.microsoft.com/office/powerpoint/2010/main" val="1431267614"/>
+      </p:ext>
+    </p:extLst>
+  </p:cSld>
+  <p:clrMapOvr>
+    <a:masterClrMapping/>
+  </p:clrMapOvr>
+</p:notes>
+</file>
+
+<file path=ppt/notesSlides/notesSlide2.xml><?xml version="1.0" encoding="utf-8"?>
+<p:notes xmlns:a="http://schemas.openxmlformats.org/drawingml/2006/main" xmlns:r="http://schemas.openxmlformats.org/officeDocument/2006/relationships" xmlns:p="http://schemas.openxmlformats.org/presentationml/2006/main">
+  <p:cSld>
+    <p:spTree>
+      <p:nvGrpSpPr>
+        <p:cNvPr id="1" name=""/>
+        <p:cNvGrpSpPr/>
+        <p:nvPr/>
+      </p:nvGrpSpPr>
+      <p:grpSpPr>
+        <a:xfrm>
+          <a:off x="0" y="0"/>
+          <a:ext cx="0" cy="0"/>
+          <a:chOff x="0" y="0"/>
+          <a:chExt cx="0" cy="0"/>
+        </a:xfrm>
+      </p:grpSpPr>
+      <p:sp>
+        <p:nvSpPr>
+          <p:cNvPr id="2" name="Slide Image Placeholder 1"/>
+          <p:cNvSpPr>
+            <a:spLocks noGrp="1" noRot="1" noChangeAspect="1"/>
+          </p:cNvSpPr>
+          <p:nvPr>
+            <p:ph type="sldImg"/>
+          </p:nvPr>
+        </p:nvSpPr>
+        <p:spPr/>
+      </p:sp>
+      <p:sp>
+        <p:nvSpPr>
+          <p:cNvPr id="3" name="Notes Placeholder 2"/>
+          <p:cNvSpPr>
+            <a:spLocks noGrp="1"/>
+          </p:cNvSpPr>
+          <p:nvPr>
+            <p:ph type="body" idx="1"/>
+          </p:nvPr>
+        </p:nvSpPr>
+        <p:spPr/>
+        <p:txBody>
+          <a:bodyPr/>
+          <a:lstStyle/>
+          <a:p>
+            <a:r>
+              <a:rPr lang="en-US" dirty="0"/>
+              <a:t>Addie</a:t>
+            </a:r>
+          </a:p>
+        </p:txBody>
+      </p:sp>
+      <p:sp>
+        <p:nvSpPr>
+          <p:cNvPr id="4" name="Slide Number Placeholder 3"/>
+          <p:cNvSpPr>
+            <a:spLocks noGrp="1"/>
+          </p:cNvSpPr>
+          <p:nvPr>
+            <p:ph type="sldNum" sz="quarter" idx="5"/>
+          </p:nvPr>
+        </p:nvSpPr>
+        <p:spPr/>
+        <p:txBody>
+          <a:bodyPr/>
+          <a:lstStyle/>
+          <a:p>
+            <a:fld id="{C7025C90-C1C1-42B7-9D47-5D69212FD166}" type="slidenum">
+              <a:rPr lang="en-US" smtClean="0"/>
+              <a:t>2</a:t>
+            </a:fld>
+            <a:endParaRPr lang="en-US"/>
+          </a:p>
+        </p:txBody>
+      </p:sp>
+    </p:spTree>
+    <p:extLst>
+      <p:ext uri="{BB962C8B-B14F-4D97-AF65-F5344CB8AC3E}">
+        <p14:creationId xmlns:p14="http://schemas.microsoft.com/office/powerpoint/2010/main" val="1862501791"/>
+      </p:ext>
+    </p:extLst>
+  </p:cSld>
+  <p:clrMapOvr>
+    <a:masterClrMapping/>
+  </p:clrMapOvr>
+</p:notes>
+</file>
+
+<file path=ppt/notesSlides/notesSlide3.xml><?xml version="1.0" encoding="utf-8"?>
+<p:notes xmlns:a="http://schemas.openxmlformats.org/drawingml/2006/main" xmlns:r="http://schemas.openxmlformats.org/officeDocument/2006/relationships" xmlns:p="http://schemas.openxmlformats.org/presentationml/2006/main">
+  <p:cSld>
+    <p:spTree>
+      <p:nvGrpSpPr>
+        <p:cNvPr id="1" name=""/>
+        <p:cNvGrpSpPr/>
+        <p:nvPr/>
+      </p:nvGrpSpPr>
+      <p:grpSpPr>
+        <a:xfrm>
+          <a:off x="0" y="0"/>
+          <a:ext cx="0" cy="0"/>
+          <a:chOff x="0" y="0"/>
+          <a:chExt cx="0" cy="0"/>
+        </a:xfrm>
+      </p:grpSpPr>
+      <p:sp>
+        <p:nvSpPr>
+          <p:cNvPr id="2" name="Slide Image Placeholder 1"/>
+          <p:cNvSpPr>
+            <a:spLocks noGrp="1" noRot="1" noChangeAspect="1"/>
+          </p:cNvSpPr>
+          <p:nvPr>
+            <p:ph type="sldImg"/>
+          </p:nvPr>
+        </p:nvSpPr>
+        <p:spPr/>
+      </p:sp>
+      <p:sp>
+        <p:nvSpPr>
+          <p:cNvPr id="3" name="Notes Placeholder 2"/>
+          <p:cNvSpPr>
+            <a:spLocks noGrp="1"/>
+          </p:cNvSpPr>
+          <p:nvPr>
+            <p:ph type="body" idx="1"/>
+          </p:nvPr>
+        </p:nvSpPr>
+        <p:spPr/>
+        <p:txBody>
+          <a:bodyPr/>
+          <a:lstStyle/>
+          <a:p>
+            <a:r>
+              <a:rPr lang="en-US" dirty="0"/>
+              <a:t>Addie</a:t>
+            </a:r>
+          </a:p>
+        </p:txBody>
+      </p:sp>
+      <p:sp>
+        <p:nvSpPr>
+          <p:cNvPr id="4" name="Slide Number Placeholder 3"/>
+          <p:cNvSpPr>
+            <a:spLocks noGrp="1"/>
+          </p:cNvSpPr>
+          <p:nvPr>
+            <p:ph type="sldNum" sz="quarter" idx="5"/>
+          </p:nvPr>
+        </p:nvSpPr>
+        <p:spPr/>
+        <p:txBody>
+          <a:bodyPr/>
+          <a:lstStyle/>
+          <a:p>
+            <a:fld id="{C7025C90-C1C1-42B7-9D47-5D69212FD166}" type="slidenum">
+              <a:rPr lang="en-US" smtClean="0"/>
+              <a:t>3</a:t>
+            </a:fld>
+            <a:endParaRPr lang="en-US"/>
+          </a:p>
+        </p:txBody>
+      </p:sp>
+    </p:spTree>
+    <p:extLst>
+      <p:ext uri="{BB962C8B-B14F-4D97-AF65-F5344CB8AC3E}">
+        <p14:creationId xmlns:p14="http://schemas.microsoft.com/office/powerpoint/2010/main" val="3670975899"/>
+      </p:ext>
+    </p:extLst>
+  </p:cSld>
+  <p:clrMapOvr>
+    <a:masterClrMapping/>
+  </p:clrMapOvr>
+</p:notes>
+</file>
+
+<file path=ppt/notesSlides/notesSlide4.xml><?xml version="1.0" encoding="utf-8"?>
+<p:notes xmlns:a="http://schemas.openxmlformats.org/drawingml/2006/main" xmlns:r="http://schemas.openxmlformats.org/officeDocument/2006/relationships" xmlns:p="http://schemas.openxmlformats.org/presentationml/2006/main">
+  <p:cSld>
+    <p:spTree>
+      <p:nvGrpSpPr>
+        <p:cNvPr id="1" name=""/>
+        <p:cNvGrpSpPr/>
+        <p:nvPr/>
+      </p:nvGrpSpPr>
+      <p:grpSpPr>
+        <a:xfrm>
+          <a:off x="0" y="0"/>
+          <a:ext cx="0" cy="0"/>
+          <a:chOff x="0" y="0"/>
+          <a:chExt cx="0" cy="0"/>
+        </a:xfrm>
+      </p:grpSpPr>
+      <p:sp>
+        <p:nvSpPr>
+          <p:cNvPr id="2" name="Slide Image Placeholder 1"/>
+          <p:cNvSpPr>
+            <a:spLocks noGrp="1" noRot="1" noChangeAspect="1"/>
+          </p:cNvSpPr>
+          <p:nvPr>
+            <p:ph type="sldImg"/>
+          </p:nvPr>
+        </p:nvSpPr>
+        <p:spPr/>
+      </p:sp>
+      <p:sp>
+        <p:nvSpPr>
+          <p:cNvPr id="3" name="Notes Placeholder 2"/>
+          <p:cNvSpPr>
+            <a:spLocks noGrp="1"/>
+          </p:cNvSpPr>
+          <p:nvPr>
+            <p:ph type="body" idx="1"/>
+          </p:nvPr>
+        </p:nvSpPr>
+        <p:spPr/>
+        <p:txBody>
+          <a:bodyPr/>
+          <a:lstStyle/>
+          <a:p>
+            <a:r>
+              <a:rPr lang="en-US" dirty="0"/>
+              <a:t>Alicia</a:t>
+            </a:r>
+          </a:p>
+        </p:txBody>
+      </p:sp>
+      <p:sp>
+        <p:nvSpPr>
+          <p:cNvPr id="4" name="Slide Number Placeholder 3"/>
+          <p:cNvSpPr>
+            <a:spLocks noGrp="1"/>
+          </p:cNvSpPr>
+          <p:nvPr>
+            <p:ph type="sldNum" sz="quarter" idx="5"/>
+          </p:nvPr>
+        </p:nvSpPr>
+        <p:spPr/>
+        <p:txBody>
+          <a:bodyPr/>
+          <a:lstStyle/>
+          <a:p>
+            <a:fld id="{C7025C90-C1C1-42B7-9D47-5D69212FD166}" type="slidenum">
+              <a:rPr lang="en-US" smtClean="0"/>
+              <a:t>4</a:t>
+            </a:fld>
+            <a:endParaRPr lang="en-US"/>
+          </a:p>
+        </p:txBody>
+      </p:sp>
+    </p:spTree>
+    <p:extLst>
+      <p:ext uri="{BB962C8B-B14F-4D97-AF65-F5344CB8AC3E}">
+        <p14:creationId xmlns:p14="http://schemas.microsoft.com/office/powerpoint/2010/main" val="3519079271"/>
+      </p:ext>
+    </p:extLst>
+  </p:cSld>
+  <p:clrMapOvr>
+    <a:masterClrMapping/>
+  </p:clrMapOvr>
+</p:notes>
+</file>
+
+<file path=ppt/notesSlides/notesSlide5.xml><?xml version="1.0" encoding="utf-8"?>
+<p:notes xmlns:a="http://schemas.openxmlformats.org/drawingml/2006/main" xmlns:r="http://schemas.openxmlformats.org/officeDocument/2006/relationships" xmlns:p="http://schemas.openxmlformats.org/presentationml/2006/main">
+  <p:cSld>
+    <p:spTree>
+      <p:nvGrpSpPr>
+        <p:cNvPr id="1" name=""/>
+        <p:cNvGrpSpPr/>
+        <p:nvPr/>
+      </p:nvGrpSpPr>
+      <p:grpSpPr>
+        <a:xfrm>
+          <a:off x="0" y="0"/>
+          <a:ext cx="0" cy="0"/>
+          <a:chOff x="0" y="0"/>
+          <a:chExt cx="0" cy="0"/>
+        </a:xfrm>
+      </p:grpSpPr>
+      <p:sp>
+        <p:nvSpPr>
+          <p:cNvPr id="2" name="Slide Image Placeholder 1"/>
+          <p:cNvSpPr>
+            <a:spLocks noGrp="1" noRot="1" noChangeAspect="1"/>
+          </p:cNvSpPr>
+          <p:nvPr>
+            <p:ph type="sldImg"/>
+          </p:nvPr>
+        </p:nvSpPr>
+        <p:spPr/>
+      </p:sp>
+      <p:sp>
+        <p:nvSpPr>
+          <p:cNvPr id="3" name="Notes Placeholder 2"/>
+          <p:cNvSpPr>
+            <a:spLocks noGrp="1"/>
+          </p:cNvSpPr>
+          <p:nvPr>
+            <p:ph type="body" idx="1"/>
+          </p:nvPr>
+        </p:nvSpPr>
+        <p:spPr/>
+        <p:txBody>
+          <a:bodyPr/>
+          <a:lstStyle/>
+          <a:p>
+            <a:r>
+              <a:rPr lang="en-US" dirty="0"/>
+              <a:t>Alicia</a:t>
+            </a:r>
+          </a:p>
+        </p:txBody>
+      </p:sp>
+      <p:sp>
+        <p:nvSpPr>
+          <p:cNvPr id="4" name="Slide Number Placeholder 3"/>
+          <p:cNvSpPr>
+            <a:spLocks noGrp="1"/>
+          </p:cNvSpPr>
+          <p:nvPr>
+            <p:ph type="sldNum" sz="quarter" idx="5"/>
+          </p:nvPr>
+        </p:nvSpPr>
+        <p:spPr/>
+        <p:txBody>
+          <a:bodyPr/>
+          <a:lstStyle/>
+          <a:p>
+            <a:fld id="{C7025C90-C1C1-42B7-9D47-5D69212FD166}" type="slidenum">
+              <a:rPr lang="en-US" smtClean="0"/>
+              <a:t>5</a:t>
+            </a:fld>
+            <a:endParaRPr lang="en-US"/>
+          </a:p>
+        </p:txBody>
+      </p:sp>
+    </p:spTree>
+    <p:extLst>
+      <p:ext uri="{BB962C8B-B14F-4D97-AF65-F5344CB8AC3E}">
+        <p14:creationId xmlns:p14="http://schemas.microsoft.com/office/powerpoint/2010/main" val="3114087323"/>
       </p:ext>
     </p:extLst>
   </p:cSld>
@@ -798,7 +1149,7 @@
             <a:fld id="{B61BEF0D-F0BB-DE4B-95CE-6DB70DBA9567}" type="datetimeFigureOut">
               <a:rPr lang="en-US" smtClean="0"/>
               <a:pPr/>
-              <a:t>11/28/2022</a:t>
+              <a:t>11/29/2022</a:t>
             </a:fld>
             <a:endParaRPr lang="en-US" dirty="0"/>
           </a:p>
@@ -1062,7 +1413,7 @@
             <a:fld id="{B61BEF0D-F0BB-DE4B-95CE-6DB70DBA9567}" type="datetimeFigureOut">
               <a:rPr lang="en-US" smtClean="0"/>
               <a:pPr/>
-              <a:t>11/28/2022</a:t>
+              <a:t>11/29/2022</a:t>
             </a:fld>
             <a:endParaRPr lang="en-US" dirty="0"/>
           </a:p>
@@ -1299,7 +1650,7 @@
             <a:fld id="{B61BEF0D-F0BB-DE4B-95CE-6DB70DBA9567}" type="datetimeFigureOut">
               <a:rPr lang="en-US" smtClean="0"/>
               <a:pPr/>
-              <a:t>11/28/2022</a:t>
+              <a:t>11/29/2022</a:t>
             </a:fld>
             <a:endParaRPr lang="en-US" dirty="0"/>
           </a:p>
@@ -1541,7 +1892,7 @@
             <a:fld id="{B61BEF0D-F0BB-DE4B-95CE-6DB70DBA9567}" type="datetimeFigureOut">
               <a:rPr lang="en-US" smtClean="0"/>
               <a:pPr/>
-              <a:t>11/28/2022</a:t>
+              <a:t>11/29/2022</a:t>
             </a:fld>
             <a:endParaRPr lang="en-US" dirty="0"/>
           </a:p>
@@ -1850,7 +2201,7 @@
             <a:fld id="{B61BEF0D-F0BB-DE4B-95CE-6DB70DBA9567}" type="datetimeFigureOut">
               <a:rPr lang="en-US" smtClean="0"/>
               <a:pPr/>
-              <a:t>11/28/2022</a:t>
+              <a:t>11/29/2022</a:t>
             </a:fld>
             <a:endParaRPr lang="en-US" dirty="0"/>
           </a:p>
@@ -2154,7 +2505,7 @@
             <a:fld id="{B61BEF0D-F0BB-DE4B-95CE-6DB70DBA9567}" type="datetimeFigureOut">
               <a:rPr lang="en-US" smtClean="0"/>
               <a:pPr/>
-              <a:t>11/28/2022</a:t>
+              <a:t>11/29/2022</a:t>
             </a:fld>
             <a:endParaRPr lang="en-US" dirty="0"/>
           </a:p>
@@ -2578,7 +2929,7 @@
             <a:fld id="{B61BEF0D-F0BB-DE4B-95CE-6DB70DBA9567}" type="datetimeFigureOut">
               <a:rPr lang="en-US" smtClean="0"/>
               <a:pPr/>
-              <a:t>11/28/2022</a:t>
+              <a:t>11/29/2022</a:t>
             </a:fld>
             <a:endParaRPr lang="en-US" dirty="0"/>
           </a:p>
@@ -2742,7 +3093,7 @@
             <a:fld id="{B61BEF0D-F0BB-DE4B-95CE-6DB70DBA9567}" type="datetimeFigureOut">
               <a:rPr lang="en-US" smtClean="0"/>
               <a:pPr/>
-              <a:t>11/28/2022</a:t>
+              <a:t>11/29/2022</a:t>
             </a:fld>
             <a:endParaRPr lang="en-US" dirty="0"/>
           </a:p>
@@ -2839,7 +3190,7 @@
             <a:fld id="{B61BEF0D-F0BB-DE4B-95CE-6DB70DBA9567}" type="datetimeFigureOut">
               <a:rPr lang="en-US" smtClean="0"/>
               <a:pPr/>
-              <a:t>11/28/2022</a:t>
+              <a:t>11/29/2022</a:t>
             </a:fld>
             <a:endParaRPr lang="en-US" dirty="0"/>
           </a:p>
@@ -3219,7 +3570,7 @@
             <a:fld id="{B61BEF0D-F0BB-DE4B-95CE-6DB70DBA9567}" type="datetimeFigureOut">
               <a:rPr lang="en-US" smtClean="0"/>
               <a:pPr/>
-              <a:t>11/28/2022</a:t>
+              <a:t>11/29/2022</a:t>
             </a:fld>
             <a:endParaRPr lang="en-US" dirty="0"/>
           </a:p>
@@ -3510,7 +3861,7 @@
             <a:fld id="{B61BEF0D-F0BB-DE4B-95CE-6DB70DBA9567}" type="datetimeFigureOut">
               <a:rPr lang="en-US" smtClean="0"/>
               <a:pPr/>
-              <a:t>11/28/2022</a:t>
+              <a:t>11/29/2022</a:t>
             </a:fld>
             <a:endParaRPr lang="en-US" dirty="0"/>
           </a:p>
@@ -3726,7 +4077,7 @@
             <a:fld id="{B61BEF0D-F0BB-DE4B-95CE-6DB70DBA9567}" type="datetimeFigureOut">
               <a:rPr lang="en-US" smtClean="0"/>
               <a:pPr/>
-              <a:t>11/28/2022</a:t>
+              <a:t>11/29/2022</a:t>
             </a:fld>
             <a:endParaRPr lang="en-US" dirty="0"/>
           </a:p>
@@ -4435,15 +4786,6 @@
           <a:effectLst>
             <a:reflection blurRad="12700" stA="38000" endPos="28000" dist="5000" dir="5400000" sy="-100000" algn="bl" rotWithShape="0"/>
           </a:effectLst>
-          <a:extLst>
-            <a:ext uri="{909E8E84-426E-40DD-AFC4-6F175D3DCCD1}">
-              <a14:hiddenFill xmlns:a14="http://schemas.microsoft.com/office/drawing/2010/main">
-                <a:solidFill>
-                  <a:srgbClr val="FFFFFF"/>
-                </a:solidFill>
-              </a14:hiddenFill>
-            </a:ext>
-          </a:extLst>
         </p:spPr>
       </p:pic>
       <p:sp>
@@ -4786,7 +5128,7 @@
           <a:lstStyle/>
           <a:p>
             <a:r>
-              <a:rPr lang="en-US" sz="2400" strike="sngStrike" dirty="0">
+              <a:rPr lang="en-US" sz="2400" dirty="0">
                 <a:solidFill>
                   <a:schemeClr val="accent5">
                     <a:lumMod val="20000"/>
@@ -4794,12 +5136,13 @@
                   </a:schemeClr>
                 </a:solidFill>
               </a:rPr>
-              <a:t>Tell us what labs you selected and why</a:t>
-            </a:r>
-          </a:p>
-          <a:p>
-            <a:r>
-              <a:rPr lang="en-US" sz="2400" dirty="0">
+              <a:t>SQL Injection Attacks</a:t>
+            </a:r>
+          </a:p>
+          <a:p>
+            <a:pPr lvl="1"/>
+            <a:r>
+              <a:rPr lang="en-US" sz="2000" dirty="0">
                 <a:solidFill>
                   <a:schemeClr val="accent5">
                     <a:lumMod val="20000"/>
@@ -4807,7 +5150,7 @@
                   </a:schemeClr>
                 </a:solidFill>
               </a:rPr>
-              <a:t>SQL Injection Attacks</a:t>
+              <a:t>Webpage creation</a:t>
             </a:r>
           </a:p>
           <a:p>
@@ -4821,7 +5164,7 @@
                   </a:schemeClr>
                 </a:solidFill>
               </a:rPr>
-              <a:t>Webpage creation</a:t>
+              <a:t>Database creation</a:t>
             </a:r>
           </a:p>
           <a:p>
@@ -4835,7 +5178,7 @@
                   </a:schemeClr>
                 </a:solidFill>
               </a:rPr>
-              <a:t>Database creation</a:t>
+              <a:t>Data cleansing</a:t>
             </a:r>
           </a:p>
           <a:p>
@@ -4849,13 +5192,12 @@
                   </a:schemeClr>
                 </a:solidFill>
               </a:rPr>
-              <a:t>Data cleansing</a:t>
-            </a:r>
-          </a:p>
-          <a:p>
-            <a:pPr lvl="1"/>
-            <a:r>
-              <a:rPr lang="en-US" sz="2000" dirty="0">
+              <a:t>Password storage/hashing</a:t>
+            </a:r>
+          </a:p>
+          <a:p>
+            <a:r>
+              <a:rPr lang="en-US" sz="2400" dirty="0">
                 <a:solidFill>
                   <a:schemeClr val="accent5">
                     <a:lumMod val="20000"/>
@@ -4863,24 +5205,41 @@
                   </a:schemeClr>
                 </a:solidFill>
               </a:rPr>
-              <a:t>Password storage/hashing</a:t>
-            </a:r>
-          </a:p>
-          <a:p>
-            <a:r>
-              <a:rPr lang="en-US" sz="2400" dirty="0">
-                <a:solidFill>
-                  <a:schemeClr val="accent5">
-                    <a:lumMod val="20000"/>
-                    <a:lumOff val="80000"/>
-                  </a:schemeClr>
-                </a:solidFill>
-              </a:rPr>
               <a:t>Why: web development + security concepts</a:t>
             </a:r>
           </a:p>
         </p:txBody>
       </p:sp>
+      <p:pic>
+        <p:nvPicPr>
+          <p:cNvPr id="5" name="Picture 4">
+            <a:extLst>
+              <a:ext uri="{FF2B5EF4-FFF2-40B4-BE49-F238E27FC236}">
+                <a16:creationId xmlns:a16="http://schemas.microsoft.com/office/drawing/2014/main" id="{8315EC89-2122-6BC1-DDC1-F621E28A78F2}"/>
+              </a:ext>
+            </a:extLst>
+          </p:cNvPr>
+          <p:cNvPicPr>
+            <a:picLocks noChangeAspect="1"/>
+          </p:cNvPicPr>
+          <p:nvPr/>
+        </p:nvPicPr>
+        <p:blipFill>
+          <a:blip r:embed="rId3"/>
+          <a:stretch>
+            <a:fillRect/>
+          </a:stretch>
+        </p:blipFill>
+        <p:spPr>
+          <a:xfrm>
+            <a:off x="6519392" y="2054206"/>
+            <a:ext cx="5127992" cy="4531412"/>
+          </a:xfrm>
+          <a:prstGeom prst="rect">
+            <a:avLst/>
+          </a:prstGeom>
+        </p:spPr>
+      </p:pic>
     </p:spTree>
     <p:extLst>
       <p:ext uri="{BB962C8B-B14F-4D97-AF65-F5344CB8AC3E}">
@@ -4911,6 +5270,66 @@
           <a:chExt cx="0" cy="0"/>
         </a:xfrm>
       </p:grpSpPr>
+      <p:sp useBgFill="1">
+        <p:nvSpPr>
+          <p:cNvPr id="10" name="Rectangle 9">
+            <a:extLst>
+              <a:ext uri="{FF2B5EF4-FFF2-40B4-BE49-F238E27FC236}">
+                <a16:creationId xmlns:a16="http://schemas.microsoft.com/office/drawing/2014/main" id="{4738AFB9-C469-4992-ADFF-2E82E8DCD015}"/>
+              </a:ext>
+              <a:ext uri="{C183D7F6-B498-43B3-948B-1728B52AA6E4}">
+                <adec:decorative xmlns:adec="http://schemas.microsoft.com/office/drawing/2017/decorative" val="1"/>
+              </a:ext>
+            </a:extLst>
+          </p:cNvPr>
+          <p:cNvSpPr>
+            <a:spLocks noGrp="1" noRot="1" noChangeAspect="1" noMove="1" noResize="1" noEditPoints="1" noAdjustHandles="1" noChangeArrowheads="1" noChangeShapeType="1" noTextEdit="1"/>
+          </p:cNvSpPr>
+          <p:nvPr>
+            <p:extLst>
+              <p:ext uri="{386F3935-93C4-4BCD-93E2-E3B085C9AB24}">
+                <p16:designElem xmlns:p16="http://schemas.microsoft.com/office/powerpoint/2015/main" val="1"/>
+              </p:ext>
+            </p:extLst>
+          </p:nvPr>
+        </p:nvSpPr>
+        <p:spPr>
+          <a:xfrm>
+            <a:off x="0" y="0"/>
+            <a:ext cx="12192000" cy="6858000"/>
+          </a:xfrm>
+          <a:prstGeom prst="rect">
+            <a:avLst/>
+          </a:prstGeom>
+          <a:ln>
+            <a:noFill/>
+          </a:ln>
+        </p:spPr>
+        <p:style>
+          <a:lnRef idx="2">
+            <a:schemeClr val="accent1">
+              <a:shade val="50000"/>
+            </a:schemeClr>
+          </a:lnRef>
+          <a:fillRef idx="1">
+            <a:schemeClr val="accent1"/>
+          </a:fillRef>
+          <a:effectRef idx="0">
+            <a:schemeClr val="accent1"/>
+          </a:effectRef>
+          <a:fontRef idx="minor">
+            <a:schemeClr val="lt1"/>
+          </a:fontRef>
+        </p:style>
+        <p:txBody>
+          <a:bodyPr rtlCol="0" anchor="ctr"/>
+          <a:lstStyle/>
+          <a:p>
+            <a:pPr algn="ctr"/>
+            <a:endParaRPr lang="en-US"/>
+          </a:p>
+        </p:txBody>
+      </p:sp>
       <p:sp>
         <p:nvSpPr>
           <p:cNvPr id="2" name="Title 1">
@@ -4927,22 +5346,225 @@
             <p:ph type="title"/>
           </p:nvPr>
         </p:nvSpPr>
-        <p:spPr/>
-        <p:txBody>
-          <a:bodyPr/>
+        <p:spPr>
+          <a:xfrm>
+            <a:off x="4382724" y="702156"/>
+            <a:ext cx="7225075" cy="1013800"/>
+          </a:xfrm>
+        </p:spPr>
+        <p:txBody>
+          <a:bodyPr>
+            <a:normAutofit/>
+          </a:bodyPr>
           <a:lstStyle/>
           <a:p>
             <a:r>
-              <a:rPr lang="en-US" sz="4000" b="1" dirty="0"/>
+              <a:rPr lang="en-US" sz="4000" b="1" dirty="0">
+                <a:solidFill>
+                  <a:schemeClr val="accent1"/>
+                </a:solidFill>
+              </a:rPr>
               <a:t>Accomplishments</a:t>
             </a:r>
             <a:r>
-              <a:rPr lang="en-US" b="1" dirty="0"/>
+              <a:rPr lang="en-US" b="1" dirty="0">
+                <a:solidFill>
+                  <a:schemeClr val="accent1"/>
+                </a:solidFill>
+              </a:rPr>
               <a:t> </a:t>
             </a:r>
           </a:p>
         </p:txBody>
       </p:sp>
+      <p:grpSp>
+        <p:nvGrpSpPr>
+          <p:cNvPr id="12" name="Group 11">
+            <a:extLst>
+              <a:ext uri="{FF2B5EF4-FFF2-40B4-BE49-F238E27FC236}">
+                <a16:creationId xmlns:a16="http://schemas.microsoft.com/office/drawing/2014/main" id="{B4B0B915-9AC5-4E4B-84C4-8B377E6878F5}"/>
+              </a:ext>
+              <a:ext uri="{C183D7F6-B498-43B3-948B-1728B52AA6E4}">
+                <adec:decorative xmlns:adec="http://schemas.microsoft.com/office/drawing/2017/decorative" val="1"/>
+              </a:ext>
+            </a:extLst>
+          </p:cNvPr>
+          <p:cNvGrpSpPr>
+            <a:grpSpLocks noGrp="1" noUngrp="1" noRot="1" noChangeAspect="1" noMove="1" noResize="1"/>
+          </p:cNvGrpSpPr>
+          <p:nvPr>
+            <p:extLst>
+              <p:ext uri="{386F3935-93C4-4BCD-93E2-E3B085C9AB24}">
+                <p16:designElem xmlns:p16="http://schemas.microsoft.com/office/powerpoint/2015/main" val="1"/>
+              </p:ext>
+            </p:extLst>
+          </p:nvPr>
+        </p:nvGrpSpPr>
+        <p:grpSpPr>
+          <a:xfrm>
+            <a:off x="446534" y="453643"/>
+            <a:ext cx="11298933" cy="98554"/>
+            <a:chOff x="446534" y="453643"/>
+            <a:chExt cx="11298933" cy="98554"/>
+          </a:xfrm>
+        </p:grpSpPr>
+        <p:sp>
+          <p:nvSpPr>
+            <p:cNvPr id="13" name="Rectangle 12">
+              <a:extLst>
+                <a:ext uri="{FF2B5EF4-FFF2-40B4-BE49-F238E27FC236}">
+                  <a16:creationId xmlns:a16="http://schemas.microsoft.com/office/drawing/2014/main" id="{388827FC-FEA8-43FF-B709-9696594AA3CD}"/>
+                </a:ext>
+                <a:ext uri="{C183D7F6-B498-43B3-948B-1728B52AA6E4}">
+                  <adec:decorative xmlns:adec="http://schemas.microsoft.com/office/drawing/2017/decorative" val="1"/>
+                </a:ext>
+              </a:extLst>
+            </p:cNvPr>
+            <p:cNvSpPr/>
+            <p:nvPr>
+              <p:extLst>
+                <p:ext uri="{386F3935-93C4-4BCD-93E2-E3B085C9AB24}">
+                  <p16:designElem xmlns:p16="http://schemas.microsoft.com/office/powerpoint/2015/main" val="1"/>
+                </p:ext>
+              </p:extLst>
+            </p:nvPr>
+          </p:nvSpPr>
+          <p:spPr>
+            <a:xfrm>
+              <a:off x="446534" y="457200"/>
+              <a:ext cx="3703320" cy="94997"/>
+            </a:xfrm>
+            <a:prstGeom prst="rect">
+              <a:avLst/>
+            </a:prstGeom>
+            <a:solidFill>
+              <a:schemeClr val="accent1"/>
+            </a:solidFill>
+            <a:ln>
+              <a:noFill/>
+            </a:ln>
+            <a:effectLst/>
+          </p:spPr>
+          <p:style>
+            <a:lnRef idx="1">
+              <a:schemeClr val="accent1"/>
+            </a:lnRef>
+            <a:fillRef idx="3">
+              <a:schemeClr val="accent1"/>
+            </a:fillRef>
+            <a:effectRef idx="2">
+              <a:schemeClr val="accent1"/>
+            </a:effectRef>
+            <a:fontRef idx="minor">
+              <a:schemeClr val="lt1"/>
+            </a:fontRef>
+          </p:style>
+        </p:sp>
+        <p:sp>
+          <p:nvSpPr>
+            <p:cNvPr id="14" name="Rectangle 13">
+              <a:extLst>
+                <a:ext uri="{FF2B5EF4-FFF2-40B4-BE49-F238E27FC236}">
+                  <a16:creationId xmlns:a16="http://schemas.microsoft.com/office/drawing/2014/main" id="{C82A3A24-9A7A-4135-BB21-051DB62CAA1F}"/>
+                </a:ext>
+                <a:ext uri="{C183D7F6-B498-43B3-948B-1728B52AA6E4}">
+                  <adec:decorative xmlns:adec="http://schemas.microsoft.com/office/drawing/2017/decorative" val="1"/>
+                </a:ext>
+              </a:extLst>
+            </p:cNvPr>
+            <p:cNvSpPr/>
+            <p:nvPr>
+              <p:extLst>
+                <p:ext uri="{386F3935-93C4-4BCD-93E2-E3B085C9AB24}">
+                  <p16:designElem xmlns:p16="http://schemas.microsoft.com/office/powerpoint/2015/main" val="1"/>
+                </p:ext>
+              </p:extLst>
+            </p:nvPr>
+          </p:nvSpPr>
+          <p:spPr>
+            <a:xfrm>
+              <a:off x="8042147" y="453643"/>
+              <a:ext cx="3703320" cy="98554"/>
+            </a:xfrm>
+            <a:prstGeom prst="rect">
+              <a:avLst/>
+            </a:prstGeom>
+            <a:solidFill>
+              <a:schemeClr val="accent4"/>
+            </a:solidFill>
+            <a:ln>
+              <a:noFill/>
+            </a:ln>
+            <a:effectLst/>
+          </p:spPr>
+          <p:style>
+            <a:lnRef idx="1">
+              <a:schemeClr val="accent1"/>
+            </a:lnRef>
+            <a:fillRef idx="3">
+              <a:schemeClr val="accent1"/>
+            </a:fillRef>
+            <a:effectRef idx="2">
+              <a:schemeClr val="accent1"/>
+            </a:effectRef>
+            <a:fontRef idx="minor">
+              <a:schemeClr val="lt1"/>
+            </a:fontRef>
+          </p:style>
+        </p:sp>
+        <p:sp>
+          <p:nvSpPr>
+            <p:cNvPr id="15" name="Rectangle 14">
+              <a:extLst>
+                <a:ext uri="{FF2B5EF4-FFF2-40B4-BE49-F238E27FC236}">
+                  <a16:creationId xmlns:a16="http://schemas.microsoft.com/office/drawing/2014/main" id="{8AC290C3-45C0-4820-9036-CA1E9D9EC6FA}"/>
+                </a:ext>
+                <a:ext uri="{C183D7F6-B498-43B3-948B-1728B52AA6E4}">
+                  <adec:decorative xmlns:adec="http://schemas.microsoft.com/office/drawing/2017/decorative" val="1"/>
+                </a:ext>
+              </a:extLst>
+            </p:cNvPr>
+            <p:cNvSpPr/>
+            <p:nvPr>
+              <p:extLst>
+                <p:ext uri="{386F3935-93C4-4BCD-93E2-E3B085C9AB24}">
+                  <p16:designElem xmlns:p16="http://schemas.microsoft.com/office/powerpoint/2015/main" val="1"/>
+                </p:ext>
+              </p:extLst>
+            </p:nvPr>
+          </p:nvSpPr>
+          <p:spPr>
+            <a:xfrm>
+              <a:off x="4241830" y="457200"/>
+              <a:ext cx="3703320" cy="91440"/>
+            </a:xfrm>
+            <a:prstGeom prst="rect">
+              <a:avLst/>
+            </a:prstGeom>
+            <a:solidFill>
+              <a:schemeClr val="accent2"/>
+            </a:solidFill>
+            <a:ln>
+              <a:noFill/>
+            </a:ln>
+            <a:effectLst/>
+          </p:spPr>
+          <p:style>
+            <a:lnRef idx="1">
+              <a:schemeClr val="accent1"/>
+            </a:lnRef>
+            <a:fillRef idx="3">
+              <a:schemeClr val="accent1"/>
+            </a:fillRef>
+            <a:effectRef idx="2">
+              <a:schemeClr val="accent1"/>
+            </a:effectRef>
+            <a:fontRef idx="minor">
+              <a:schemeClr val="lt1"/>
+            </a:fontRef>
+          </p:style>
+        </p:sp>
+      </p:grpSp>
       <p:sp>
         <p:nvSpPr>
           <p:cNvPr id="3" name="Content Placeholder 2">
@@ -4959,15 +5581,20 @@
             <p:ph idx="1"/>
           </p:nvPr>
         </p:nvSpPr>
-        <p:spPr/>
+        <p:spPr>
+          <a:xfrm>
+            <a:off x="4382726" y="1896533"/>
+            <a:ext cx="7225074" cy="3962266"/>
+          </a:xfrm>
+        </p:spPr>
         <p:txBody>
           <a:bodyPr>
-            <a:normAutofit fontScale="92500" lnSpcReduction="20000"/>
+            <a:normAutofit fontScale="92500" lnSpcReduction="10000"/>
           </a:bodyPr>
           <a:lstStyle/>
           <a:p>
             <a:r>
-              <a:rPr lang="en-US" sz="2400" strike="sngStrike" dirty="0">
+              <a:rPr lang="en-US" sz="2400" dirty="0">
                 <a:solidFill>
                   <a:schemeClr val="accent5">
                     <a:lumMod val="20000"/>
@@ -4975,12 +5602,13 @@
                   </a:schemeClr>
                 </a:solidFill>
               </a:rPr>
-              <a:t>What did you _do_?</a:t>
-            </a:r>
-          </a:p>
-          <a:p>
-            <a:r>
-              <a:rPr lang="en-US" sz="2400" dirty="0">
+              <a:t>Created two company websites- a vulnerable and a secure site</a:t>
+            </a:r>
+          </a:p>
+          <a:p>
+            <a:pPr lvl="1"/>
+            <a:r>
+              <a:rPr lang="en-US" sz="2000" dirty="0">
                 <a:solidFill>
                   <a:schemeClr val="accent5">
                     <a:lumMod val="20000"/>
@@ -4988,13 +5616,12 @@
                   </a:schemeClr>
                 </a:solidFill>
               </a:rPr>
-              <a:t>Created two company websites- a vulnerable and a secure site</a:t>
-            </a:r>
-          </a:p>
-          <a:p>
-            <a:pPr lvl="1"/>
-            <a:r>
-              <a:rPr lang="en-US" sz="2000" dirty="0">
+              <a:t>Using a Go and SQL backend</a:t>
+            </a:r>
+          </a:p>
+          <a:p>
+            <a:r>
+              <a:rPr lang="en-US" sz="2400" dirty="0">
                 <a:solidFill>
                   <a:schemeClr val="accent5">
                     <a:lumMod val="20000"/>
@@ -5002,12 +5629,13 @@
                   </a:schemeClr>
                 </a:solidFill>
               </a:rPr>
-              <a:t>Using a Go and SQL backend</a:t>
-            </a:r>
-          </a:p>
-          <a:p>
-            <a:r>
-              <a:rPr lang="en-US" sz="2400" dirty="0">
+              <a:t>Vulnerable page:</a:t>
+            </a:r>
+          </a:p>
+          <a:p>
+            <a:pPr lvl="1"/>
+            <a:r>
+              <a:rPr lang="en-US" sz="2000" dirty="0">
                 <a:solidFill>
                   <a:schemeClr val="accent5">
                     <a:lumMod val="20000"/>
@@ -5015,7 +5643,7 @@
                   </a:schemeClr>
                 </a:solidFill>
               </a:rPr>
-              <a:t>Vulnerable page:</a:t>
+              <a:t>Lets you drop the users and contacts tables from the front end</a:t>
             </a:r>
           </a:p>
           <a:p>
@@ -5029,13 +5657,12 @@
                   </a:schemeClr>
                 </a:solidFill>
               </a:rPr>
-              <a:t>Lets you drop the users and contacts tables from the front end</a:t>
-            </a:r>
-          </a:p>
-          <a:p>
-            <a:pPr lvl="1"/>
-            <a:r>
-              <a:rPr lang="en-US" sz="2000" dirty="0">
+              <a:t>Stores passwords as plaintext</a:t>
+            </a:r>
+          </a:p>
+          <a:p>
+            <a:r>
+              <a:rPr lang="en-US" sz="2400" dirty="0">
                 <a:solidFill>
                   <a:schemeClr val="accent5">
                     <a:lumMod val="20000"/>
@@ -5043,12 +5670,13 @@
                   </a:schemeClr>
                 </a:solidFill>
               </a:rPr>
-              <a:t>Stores passwords as plaintext</a:t>
-            </a:r>
-          </a:p>
-          <a:p>
-            <a:r>
-              <a:rPr lang="en-US" sz="2400" dirty="0">
+              <a:t>Secure page:</a:t>
+            </a:r>
+          </a:p>
+          <a:p>
+            <a:pPr lvl="1"/>
+            <a:r>
+              <a:rPr lang="en-US" sz="2000" dirty="0">
                 <a:solidFill>
                   <a:schemeClr val="accent5">
                     <a:lumMod val="20000"/>
@@ -5056,13 +5684,10 @@
                   </a:schemeClr>
                 </a:solidFill>
               </a:rPr>
-              <a:t>Secure page:</a:t>
-            </a:r>
-          </a:p>
-          <a:p>
-            <a:pPr lvl="1"/>
-            <a:r>
-              <a:rPr lang="en-US" sz="2000" dirty="0">
+              <a:t>Implements Go’s database/</a:t>
+            </a:r>
+            <a:r>
+              <a:rPr lang="en-US" sz="2000" dirty="0" err="1">
                 <a:solidFill>
                   <a:schemeClr val="accent5">
                     <a:lumMod val="20000"/>
@@ -5070,10 +5695,10 @@
                   </a:schemeClr>
                 </a:solidFill>
               </a:rPr>
-              <a:t>Implements Go’s “</a:t>
-            </a:r>
-            <a:r>
-              <a:rPr lang="en-US" sz="2000" dirty="0" err="1">
+              <a:t>sql</a:t>
+            </a:r>
+            <a:r>
+              <a:rPr lang="en-US" sz="2000" dirty="0">
                 <a:solidFill>
                   <a:schemeClr val="accent5">
                     <a:lumMod val="20000"/>
@@ -5081,10 +5706,10 @@
                   </a:schemeClr>
                 </a:solidFill>
               </a:rPr>
-              <a:t>sql</a:t>
-            </a:r>
-            <a:r>
-              <a:rPr lang="en-US" sz="2000" dirty="0">
+              <a:t> library’s functionality for safe </a:t>
+            </a:r>
+            <a:r>
+              <a:rPr lang="en-US" sz="2000" dirty="0" err="1">
                 <a:solidFill>
                   <a:schemeClr val="accent5">
                     <a:lumMod val="20000"/>
@@ -5092,10 +5717,10 @@
                   </a:schemeClr>
                 </a:solidFill>
               </a:rPr>
-              <a:t>” library’s functionality for safe </a:t>
-            </a:r>
-            <a:r>
-              <a:rPr lang="en-US" sz="2000" dirty="0" err="1">
+              <a:t>sql</a:t>
+            </a:r>
+            <a:r>
+              <a:rPr lang="en-US" sz="2000" dirty="0">
                 <a:solidFill>
                   <a:schemeClr val="accent5">
                     <a:lumMod val="20000"/>
@@ -5103,8 +5728,11 @@
                   </a:schemeClr>
                 </a:solidFill>
               </a:rPr>
-              <a:t>sql</a:t>
-            </a:r>
+              <a:t> query parameter passing</a:t>
+            </a:r>
+          </a:p>
+          <a:p>
+            <a:pPr lvl="1"/>
             <a:r>
               <a:rPr lang="en-US" sz="2000" dirty="0">
                 <a:solidFill>
@@ -5114,25 +5742,41 @@
                   </a:schemeClr>
                 </a:solidFill>
               </a:rPr>
-              <a:t> query parameter passing</a:t>
-            </a:r>
-          </a:p>
-          <a:p>
-            <a:pPr lvl="1"/>
-            <a:r>
-              <a:rPr lang="en-US" sz="2000" dirty="0">
-                <a:solidFill>
-                  <a:schemeClr val="accent5">
-                    <a:lumMod val="20000"/>
-                    <a:lumOff val="80000"/>
-                  </a:schemeClr>
-                </a:solidFill>
-              </a:rPr>
               <a:t>Stores passwords as hashes</a:t>
             </a:r>
           </a:p>
         </p:txBody>
       </p:sp>
+      <p:pic>
+        <p:nvPicPr>
+          <p:cNvPr id="7" name="Picture 6">
+            <a:extLst>
+              <a:ext uri="{FF2B5EF4-FFF2-40B4-BE49-F238E27FC236}">
+                <a16:creationId xmlns:a16="http://schemas.microsoft.com/office/drawing/2014/main" id="{2BF26100-B45A-439A-A7C0-A5FE07C93835}"/>
+              </a:ext>
+            </a:extLst>
+          </p:cNvPr>
+          <p:cNvPicPr>
+            <a:picLocks noChangeAspect="1"/>
+          </p:cNvPicPr>
+          <p:nvPr/>
+        </p:nvPicPr>
+        <p:blipFill>
+          <a:blip r:embed="rId3"/>
+          <a:stretch>
+            <a:fillRect/>
+          </a:stretch>
+        </p:blipFill>
+        <p:spPr>
+          <a:xfrm>
+            <a:off x="446534" y="1100838"/>
+            <a:ext cx="3712791" cy="5081300"/>
+          </a:xfrm>
+          <a:prstGeom prst="rect">
+            <a:avLst/>
+          </a:prstGeom>
+        </p:spPr>
+      </p:pic>
     </p:spTree>
     <p:extLst>
       <p:ext uri="{BB962C8B-B14F-4D97-AF65-F5344CB8AC3E}">
@@ -5149,6 +5793,14 @@
 <file path=ppt/slides/slide4.xml><?xml version="1.0" encoding="utf-8"?>
 <p:sld xmlns:a="http://schemas.openxmlformats.org/drawingml/2006/main" xmlns:r="http://schemas.openxmlformats.org/officeDocument/2006/relationships" xmlns:p="http://schemas.openxmlformats.org/presentationml/2006/main">
   <p:cSld>
+    <p:bg>
+      <p:bgPr>
+        <a:solidFill>
+          <a:srgbClr val="FFDE59"/>
+        </a:solidFill>
+        <a:effectLst/>
+      </p:bgPr>
+    </p:bg>
     <p:spTree>
       <p:nvGrpSpPr>
         <p:cNvPr id="1" name=""/>
@@ -5165,79 +5817,1537 @@
       </p:grpSpPr>
       <p:sp>
         <p:nvSpPr>
-          <p:cNvPr id="2" name="Title 1">
+          <p:cNvPr id="4" name="Cloud 3">
             <a:extLst>
               <a:ext uri="{FF2B5EF4-FFF2-40B4-BE49-F238E27FC236}">
-                <a16:creationId xmlns:a16="http://schemas.microsoft.com/office/drawing/2014/main" id="{63641A7C-5DA6-A642-BF78-9B48BB88C8D2}"/>
+                <a16:creationId xmlns:a16="http://schemas.microsoft.com/office/drawing/2014/main" id="{F2C55AB7-29B0-BD28-8B3E-DE3DB73ABA3D}"/>
               </a:ext>
             </a:extLst>
           </p:cNvPr>
-          <p:cNvSpPr>
-            <a:spLocks noGrp="1"/>
-          </p:cNvSpPr>
-          <p:nvPr>
-            <p:ph type="title"/>
-          </p:nvPr>
-        </p:nvSpPr>
-        <p:spPr/>
-        <p:txBody>
-          <a:bodyPr/>
+          <p:cNvSpPr/>
+          <p:nvPr/>
+        </p:nvSpPr>
+        <p:spPr>
+          <a:xfrm>
+            <a:off x="3093720" y="640080"/>
+            <a:ext cx="9098280" cy="6121400"/>
+          </a:xfrm>
+          <a:prstGeom prst="cloud">
+            <a:avLst/>
+          </a:prstGeom>
+        </p:spPr>
+        <p:style>
+          <a:lnRef idx="2">
+            <a:schemeClr val="accent4">
+              <a:shade val="50000"/>
+            </a:schemeClr>
+          </a:lnRef>
+          <a:fillRef idx="1">
+            <a:schemeClr val="accent4"/>
+          </a:fillRef>
+          <a:effectRef idx="0">
+            <a:schemeClr val="accent4"/>
+          </a:effectRef>
+          <a:fontRef idx="minor">
+            <a:schemeClr val="lt1"/>
+          </a:fontRef>
+        </p:style>
+        <p:txBody>
+          <a:bodyPr rtlCol="0" anchor="ctr"/>
           <a:lstStyle/>
           <a:p>
-            <a:r>
-              <a:rPr lang="en-US" sz="4000" b="1" dirty="0"/>
-              <a:t>Challenges</a:t>
-            </a:r>
-            <a:endParaRPr lang="en-US" b="1" dirty="0"/>
-          </a:p>
-        </p:txBody>
-      </p:sp>
-      <p:sp>
-        <p:nvSpPr>
-          <p:cNvPr id="3" name="Content Placeholder 2">
+            <a:pPr algn="ctr"/>
+            <a:endParaRPr lang="en-US"/>
+          </a:p>
+        </p:txBody>
+      </p:sp>
+      <p:sp>
+        <p:nvSpPr>
+          <p:cNvPr id="10" name="Title 1">
             <a:extLst>
               <a:ext uri="{FF2B5EF4-FFF2-40B4-BE49-F238E27FC236}">
-                <a16:creationId xmlns:a16="http://schemas.microsoft.com/office/drawing/2014/main" id="{E2BA4BB6-3332-C64F-92B9-0DE727427A53}"/>
+                <a16:creationId xmlns:a16="http://schemas.microsoft.com/office/drawing/2014/main" id="{9CB5705E-802B-B72E-D8B9-EC552F6249C5}"/>
               </a:ext>
             </a:extLst>
           </p:cNvPr>
-          <p:cNvSpPr>
-            <a:spLocks noGrp="1"/>
-          </p:cNvSpPr>
-          <p:nvPr>
-            <p:ph idx="1"/>
-          </p:nvPr>
-        </p:nvSpPr>
-        <p:spPr/>
-        <p:txBody>
-          <a:bodyPr>
+          <p:cNvSpPr txBox="1">
+            <a:spLocks/>
+          </p:cNvSpPr>
+          <p:nvPr/>
+        </p:nvSpPr>
+        <p:spPr>
+          <a:xfrm>
+            <a:off x="581192" y="701675"/>
+            <a:ext cx="11029950" cy="1014413"/>
+          </a:xfrm>
+          <a:prstGeom prst="rect">
+            <a:avLst/>
+          </a:prstGeom>
+        </p:spPr>
+        <p:txBody>
+          <a:bodyPr vert="horz" lIns="91440" tIns="45720" rIns="91440" bIns="45720" rtlCol="0" anchor="b">
             <a:normAutofit/>
           </a:bodyPr>
+          <a:lstStyle>
+            <a:lvl1pPr algn="l" defTabSz="457200" rtl="0" eaLnBrk="1" latinLnBrk="0" hangingPunct="1">
+              <a:spcBef>
+                <a:spcPct val="0"/>
+              </a:spcBef>
+              <a:buNone/>
+              <a:defRPr sz="2800" b="0" kern="1200" cap="all">
+                <a:solidFill>
+                  <a:schemeClr val="bg1"/>
+                </a:solidFill>
+                <a:latin typeface="+mj-lt"/>
+                <a:ea typeface="+mj-ea"/>
+                <a:cs typeface="+mj-cs"/>
+              </a:defRPr>
+            </a:lvl1pPr>
+            <a:lvl2pPr eaLnBrk="1" hangingPunct="1">
+              <a:defRPr>
+                <a:solidFill>
+                  <a:schemeClr val="tx2"/>
+                </a:solidFill>
+              </a:defRPr>
+            </a:lvl2pPr>
+            <a:lvl3pPr eaLnBrk="1" hangingPunct="1">
+              <a:defRPr>
+                <a:solidFill>
+                  <a:schemeClr val="tx2"/>
+                </a:solidFill>
+              </a:defRPr>
+            </a:lvl3pPr>
+            <a:lvl4pPr eaLnBrk="1" hangingPunct="1">
+              <a:defRPr>
+                <a:solidFill>
+                  <a:schemeClr val="tx2"/>
+                </a:solidFill>
+              </a:defRPr>
+            </a:lvl4pPr>
+            <a:lvl5pPr eaLnBrk="1" hangingPunct="1">
+              <a:defRPr>
+                <a:solidFill>
+                  <a:schemeClr val="tx2"/>
+                </a:solidFill>
+              </a:defRPr>
+            </a:lvl5pPr>
+            <a:lvl6pPr eaLnBrk="1" hangingPunct="1">
+              <a:defRPr>
+                <a:solidFill>
+                  <a:schemeClr val="tx2"/>
+                </a:solidFill>
+              </a:defRPr>
+            </a:lvl6pPr>
+            <a:lvl7pPr eaLnBrk="1" hangingPunct="1">
+              <a:defRPr>
+                <a:solidFill>
+                  <a:schemeClr val="tx2"/>
+                </a:solidFill>
+              </a:defRPr>
+            </a:lvl7pPr>
+            <a:lvl8pPr eaLnBrk="1" hangingPunct="1">
+              <a:defRPr>
+                <a:solidFill>
+                  <a:schemeClr val="tx2"/>
+                </a:solidFill>
+              </a:defRPr>
+            </a:lvl8pPr>
+            <a:lvl9pPr eaLnBrk="1" hangingPunct="1">
+              <a:defRPr>
+                <a:solidFill>
+                  <a:schemeClr val="tx2"/>
+                </a:solidFill>
+              </a:defRPr>
+            </a:lvl9pPr>
+          </a:lstStyle>
+          <a:p>
+            <a:r>
+              <a:rPr lang="en-US" sz="4000" b="1" dirty="0"/>
+              <a:t>Challenges</a:t>
+            </a:r>
+          </a:p>
+        </p:txBody>
+      </p:sp>
+      <p:sp>
+        <p:nvSpPr>
+          <p:cNvPr id="20" name="Rectangle 19">
+            <a:extLst>
+              <a:ext uri="{FF2B5EF4-FFF2-40B4-BE49-F238E27FC236}">
+                <a16:creationId xmlns:a16="http://schemas.microsoft.com/office/drawing/2014/main" id="{3C946106-97AD-8835-6BA4-BD61A055B3ED}"/>
+              </a:ext>
+            </a:extLst>
+          </p:cNvPr>
+          <p:cNvSpPr/>
+          <p:nvPr/>
+        </p:nvSpPr>
+        <p:spPr>
+          <a:xfrm>
+            <a:off x="447040" y="457200"/>
+            <a:ext cx="3718560" cy="91440"/>
+          </a:xfrm>
+          <a:prstGeom prst="rect">
+            <a:avLst/>
+          </a:prstGeom>
+          <a:solidFill>
+            <a:srgbClr val="3D3C3C"/>
+          </a:solidFill>
+          <a:ln>
+            <a:solidFill>
+              <a:srgbClr val="3D3C3C"/>
+            </a:solidFill>
+          </a:ln>
+        </p:spPr>
+        <p:style>
+          <a:lnRef idx="2">
+            <a:schemeClr val="accent1">
+              <a:shade val="50000"/>
+            </a:schemeClr>
+          </a:lnRef>
+          <a:fillRef idx="1">
+            <a:schemeClr val="accent1"/>
+          </a:fillRef>
+          <a:effectRef idx="0">
+            <a:schemeClr val="accent1"/>
+          </a:effectRef>
+          <a:fontRef idx="minor">
+            <a:schemeClr val="lt1"/>
+          </a:fontRef>
+        </p:style>
+        <p:txBody>
+          <a:bodyPr rtlCol="0" anchor="ctr"/>
           <a:lstStyle/>
           <a:p>
+            <a:pPr algn="ctr"/>
+            <a:endParaRPr lang="en-US">
+              <a:solidFill>
+                <a:srgbClr val="3D3C3C"/>
+              </a:solidFill>
+            </a:endParaRPr>
+          </a:p>
+        </p:txBody>
+      </p:sp>
+      <p:sp>
+        <p:nvSpPr>
+          <p:cNvPr id="2" name="Content Placeholder 2">
+            <a:extLst>
+              <a:ext uri="{FF2B5EF4-FFF2-40B4-BE49-F238E27FC236}">
+                <a16:creationId xmlns:a16="http://schemas.microsoft.com/office/drawing/2014/main" id="{C936F3FF-977B-CF2E-2616-1C066DEB01E4}"/>
+              </a:ext>
+            </a:extLst>
+          </p:cNvPr>
+          <p:cNvSpPr txBox="1">
+            <a:spLocks/>
+          </p:cNvSpPr>
+          <p:nvPr/>
+        </p:nvSpPr>
+        <p:spPr>
+          <a:xfrm>
+            <a:off x="4093240" y="3429905"/>
+            <a:ext cx="6693855" cy="1737218"/>
+          </a:xfrm>
+          <a:prstGeom prst="rect">
+            <a:avLst/>
+          </a:prstGeom>
+        </p:spPr>
+        <p:txBody>
+          <a:bodyPr anchor="b">
+            <a:normAutofit/>
+          </a:bodyPr>
+          <a:lstStyle>
+            <a:lvl1pPr marL="306000" indent="-306000" algn="l" defTabSz="457200" rtl="0" eaLnBrk="1" latinLnBrk="0" hangingPunct="1">
+              <a:spcBef>
+                <a:spcPct val="20000"/>
+              </a:spcBef>
+              <a:spcAft>
+                <a:spcPts val="600"/>
+              </a:spcAft>
+              <a:buClr>
+                <a:schemeClr val="accent2"/>
+              </a:buClr>
+              <a:buSzPct val="92000"/>
+              <a:buFont typeface="Wingdings 2" panose="05020102010507070707" pitchFamily="18" charset="2"/>
+              <a:buChar char=""/>
+              <a:defRPr sz="1800" kern="1200">
+                <a:solidFill>
+                  <a:schemeClr val="tx2"/>
+                </a:solidFill>
+                <a:latin typeface="+mn-lt"/>
+                <a:ea typeface="+mn-ea"/>
+                <a:cs typeface="+mn-cs"/>
+              </a:defRPr>
+            </a:lvl1pPr>
+            <a:lvl2pPr marL="630000" indent="-306000" algn="l" defTabSz="457200" rtl="0" eaLnBrk="1" latinLnBrk="0" hangingPunct="1">
+              <a:spcBef>
+                <a:spcPct val="20000"/>
+              </a:spcBef>
+              <a:spcAft>
+                <a:spcPts val="600"/>
+              </a:spcAft>
+              <a:buClr>
+                <a:schemeClr val="accent2"/>
+              </a:buClr>
+              <a:buSzPct val="92000"/>
+              <a:buFont typeface="Wingdings 2" panose="05020102010507070707" pitchFamily="18" charset="2"/>
+              <a:buChar char=""/>
+              <a:defRPr sz="1600" kern="1200">
+                <a:solidFill>
+                  <a:schemeClr val="tx2"/>
+                </a:solidFill>
+                <a:latin typeface="+mn-lt"/>
+                <a:ea typeface="+mn-ea"/>
+                <a:cs typeface="+mn-cs"/>
+              </a:defRPr>
+            </a:lvl2pPr>
+            <a:lvl3pPr marL="900000" indent="-270000" algn="l" defTabSz="457200" rtl="0" eaLnBrk="1" latinLnBrk="0" hangingPunct="1">
+              <a:spcBef>
+                <a:spcPct val="20000"/>
+              </a:spcBef>
+              <a:spcAft>
+                <a:spcPts val="600"/>
+              </a:spcAft>
+              <a:buClr>
+                <a:schemeClr val="accent2"/>
+              </a:buClr>
+              <a:buSzPct val="92000"/>
+              <a:buFont typeface="Wingdings 2" panose="05020102010507070707" pitchFamily="18" charset="2"/>
+              <a:buChar char=""/>
+              <a:defRPr sz="1400" kern="1200">
+                <a:solidFill>
+                  <a:schemeClr val="tx2"/>
+                </a:solidFill>
+                <a:latin typeface="+mn-lt"/>
+                <a:ea typeface="+mn-ea"/>
+                <a:cs typeface="+mn-cs"/>
+              </a:defRPr>
+            </a:lvl3pPr>
+            <a:lvl4pPr marL="1242000" indent="-234000" algn="l" defTabSz="457200" rtl="0" eaLnBrk="1" latinLnBrk="0" hangingPunct="1">
+              <a:spcBef>
+                <a:spcPct val="20000"/>
+              </a:spcBef>
+              <a:spcAft>
+                <a:spcPts val="600"/>
+              </a:spcAft>
+              <a:buClr>
+                <a:schemeClr val="accent2"/>
+              </a:buClr>
+              <a:buSzPct val="92000"/>
+              <a:buFont typeface="Wingdings 2" panose="05020102010507070707" pitchFamily="18" charset="2"/>
+              <a:buChar char=""/>
+              <a:defRPr sz="1200" kern="1200">
+                <a:solidFill>
+                  <a:schemeClr val="tx2"/>
+                </a:solidFill>
+                <a:latin typeface="+mn-lt"/>
+                <a:ea typeface="+mn-ea"/>
+                <a:cs typeface="+mn-cs"/>
+              </a:defRPr>
+            </a:lvl4pPr>
+            <a:lvl5pPr marL="1602000" indent="-234000" algn="l" defTabSz="457200" rtl="0" eaLnBrk="1" latinLnBrk="0" hangingPunct="1">
+              <a:spcBef>
+                <a:spcPct val="20000"/>
+              </a:spcBef>
+              <a:spcAft>
+                <a:spcPts val="600"/>
+              </a:spcAft>
+              <a:buClr>
+                <a:schemeClr val="accent2"/>
+              </a:buClr>
+              <a:buSzPct val="92000"/>
+              <a:buFont typeface="Wingdings 2" panose="05020102010507070707" pitchFamily="18" charset="2"/>
+              <a:buChar char=""/>
+              <a:defRPr sz="1200" kern="1200">
+                <a:solidFill>
+                  <a:schemeClr val="tx2"/>
+                </a:solidFill>
+                <a:latin typeface="+mn-lt"/>
+                <a:ea typeface="+mn-ea"/>
+                <a:cs typeface="+mn-cs"/>
+              </a:defRPr>
+            </a:lvl5pPr>
+            <a:lvl6pPr marL="1900000" indent="-228600" algn="l" defTabSz="457200" rtl="0" eaLnBrk="1" latinLnBrk="0" hangingPunct="1">
+              <a:spcBef>
+                <a:spcPct val="20000"/>
+              </a:spcBef>
+              <a:spcAft>
+                <a:spcPts val="600"/>
+              </a:spcAft>
+              <a:buClr>
+                <a:schemeClr val="accent2"/>
+              </a:buClr>
+              <a:buSzPct val="92000"/>
+              <a:buFont typeface="Wingdings 2" panose="05020102010507070707" pitchFamily="18" charset="2"/>
+              <a:buChar char=""/>
+              <a:defRPr sz="1200" kern="1200">
+                <a:solidFill>
+                  <a:schemeClr val="tx2"/>
+                </a:solidFill>
+                <a:latin typeface="+mn-lt"/>
+                <a:ea typeface="+mn-ea"/>
+                <a:cs typeface="+mn-cs"/>
+              </a:defRPr>
+            </a:lvl6pPr>
+            <a:lvl7pPr marL="2200000" indent="-228600" algn="l" defTabSz="457200" rtl="0" eaLnBrk="1" latinLnBrk="0" hangingPunct="1">
+              <a:spcBef>
+                <a:spcPct val="20000"/>
+              </a:spcBef>
+              <a:spcAft>
+                <a:spcPts val="600"/>
+              </a:spcAft>
+              <a:buClr>
+                <a:schemeClr val="accent2"/>
+              </a:buClr>
+              <a:buSzPct val="92000"/>
+              <a:buFont typeface="Wingdings 2" panose="05020102010507070707" pitchFamily="18" charset="2"/>
+              <a:buChar char=""/>
+              <a:defRPr sz="1200" kern="1200">
+                <a:solidFill>
+                  <a:schemeClr val="tx2"/>
+                </a:solidFill>
+                <a:latin typeface="+mn-lt"/>
+                <a:ea typeface="+mn-ea"/>
+                <a:cs typeface="+mn-cs"/>
+              </a:defRPr>
+            </a:lvl7pPr>
+            <a:lvl8pPr marL="2500000" indent="-228600" algn="l" defTabSz="457200" rtl="0" eaLnBrk="1" latinLnBrk="0" hangingPunct="1">
+              <a:spcBef>
+                <a:spcPct val="20000"/>
+              </a:spcBef>
+              <a:spcAft>
+                <a:spcPts val="600"/>
+              </a:spcAft>
+              <a:buClr>
+                <a:schemeClr val="accent2"/>
+              </a:buClr>
+              <a:buSzPct val="92000"/>
+              <a:buFont typeface="Wingdings 2" panose="05020102010507070707" pitchFamily="18" charset="2"/>
+              <a:buChar char=""/>
+              <a:defRPr sz="1200" kern="1200">
+                <a:solidFill>
+                  <a:schemeClr val="tx2"/>
+                </a:solidFill>
+                <a:latin typeface="+mn-lt"/>
+                <a:ea typeface="+mn-ea"/>
+                <a:cs typeface="+mn-cs"/>
+              </a:defRPr>
+            </a:lvl8pPr>
+            <a:lvl9pPr marL="2800000" indent="-228600" algn="l" defTabSz="457200" rtl="0" eaLnBrk="1" latinLnBrk="0" hangingPunct="1">
+              <a:spcBef>
+                <a:spcPct val="20000"/>
+              </a:spcBef>
+              <a:spcAft>
+                <a:spcPts val="600"/>
+              </a:spcAft>
+              <a:buClr>
+                <a:schemeClr val="accent2"/>
+              </a:buClr>
+              <a:buSzPct val="92000"/>
+              <a:buFont typeface="Wingdings 2" panose="05020102010507070707" pitchFamily="18" charset="2"/>
+              <a:buChar char=""/>
+              <a:defRPr sz="1200" kern="1200">
+                <a:solidFill>
+                  <a:schemeClr val="tx2"/>
+                </a:solidFill>
+                <a:latin typeface="+mn-lt"/>
+                <a:ea typeface="+mn-ea"/>
+                <a:cs typeface="+mn-cs"/>
+              </a:defRPr>
+            </a:lvl9pPr>
+          </a:lstStyle>
+          <a:p>
+            <a:pPr marL="0" indent="0">
+              <a:buClr>
+                <a:schemeClr val="bg2"/>
+              </a:buClr>
+              <a:buNone/>
+            </a:pPr>
+            <a:endParaRPr lang="en-US" sz="2000" dirty="0">
+              <a:solidFill>
+                <a:schemeClr val="accent6">
+                  <a:lumMod val="75000"/>
+                </a:schemeClr>
+              </a:solidFill>
+            </a:endParaRPr>
+          </a:p>
+          <a:p>
+            <a:pPr>
+              <a:buClr>
+                <a:schemeClr val="bg2"/>
+              </a:buClr>
+            </a:pPr>
+            <a:r>
+              <a:rPr lang="en-US" sz="2400" b="1" dirty="0">
+                <a:solidFill>
+                  <a:schemeClr val="accent6">
+                    <a:lumMod val="75000"/>
+                  </a:schemeClr>
+                </a:solidFill>
+              </a:rPr>
+              <a:t>How to Overcome:</a:t>
+            </a:r>
             <a:r>
               <a:rPr lang="en-US" sz="2000" dirty="0">
                 <a:solidFill>
-                  <a:schemeClr val="accent5">
-                    <a:lumMod val="20000"/>
-                    <a:lumOff val="80000"/>
+                  <a:schemeClr val="accent6">
+                    <a:lumMod val="75000"/>
                   </a:schemeClr>
                 </a:solidFill>
               </a:rPr>
-              <a:t>What challenges did you face? </a:t>
-            </a:r>
-          </a:p>
-          <a:p>
+              <a:t> Just patiently work through all the problems and errors of installing software on each machine and Googling as errors came up</a:t>
+            </a:r>
+          </a:p>
+        </p:txBody>
+      </p:sp>
+      <p:pic>
+        <p:nvPicPr>
+          <p:cNvPr id="1028" name="Picture 4" descr="The Go Gopher - The Go Programming Language">
+            <a:extLst>
+              <a:ext uri="{FF2B5EF4-FFF2-40B4-BE49-F238E27FC236}">
+                <a16:creationId xmlns:a16="http://schemas.microsoft.com/office/drawing/2014/main" id="{E394B2E1-A8DC-39A4-0E3E-E2623C37D4FF}"/>
+              </a:ext>
+            </a:extLst>
+          </p:cNvPr>
+          <p:cNvPicPr>
+            <a:picLocks noChangeAspect="1" noChangeArrowheads="1"/>
+          </p:cNvPicPr>
+          <p:nvPr/>
+        </p:nvPicPr>
+        <p:blipFill>
+          <a:blip r:embed="rId3">
+            <a:extLst>
+              <a:ext uri="{28A0092B-C50C-407E-A947-70E740481C1C}">
+                <a14:useLocalDpi xmlns:a14="http://schemas.microsoft.com/office/drawing/2010/main" val="0"/>
+              </a:ext>
+            </a:extLst>
+          </a:blip>
+          <a:srcRect/>
+          <a:stretch>
+            <a:fillRect/>
+          </a:stretch>
+        </p:blipFill>
+        <p:spPr bwMode="auto">
+          <a:xfrm>
+            <a:off x="122171" y="3903980"/>
+            <a:ext cx="2333625" cy="2857500"/>
+          </a:xfrm>
+          <a:prstGeom prst="rect">
+            <a:avLst/>
+          </a:prstGeom>
+          <a:noFill/>
+          <a:extLst>
+            <a:ext uri="{909E8E84-426E-40DD-AFC4-6F175D3DCCD1}">
+              <a14:hiddenFill xmlns:a14="http://schemas.microsoft.com/office/drawing/2010/main">
+                <a:solidFill>
+                  <a:srgbClr val="FFFFFF"/>
+                </a:solidFill>
+              </a14:hiddenFill>
+            </a:ext>
+          </a:extLst>
+        </p:spPr>
+      </p:pic>
+      <p:sp>
+        <p:nvSpPr>
+          <p:cNvPr id="5" name="Flowchart: Connector 4">
+            <a:extLst>
+              <a:ext uri="{FF2B5EF4-FFF2-40B4-BE49-F238E27FC236}">
+                <a16:creationId xmlns:a16="http://schemas.microsoft.com/office/drawing/2014/main" id="{B78830C3-B106-21B9-3852-90B499F77654}"/>
+              </a:ext>
+            </a:extLst>
+          </p:cNvPr>
+          <p:cNvSpPr/>
+          <p:nvPr/>
+        </p:nvSpPr>
+        <p:spPr>
+          <a:xfrm>
+            <a:off x="2616200" y="1695450"/>
+            <a:ext cx="1092894" cy="1061720"/>
+          </a:xfrm>
+          <a:prstGeom prst="flowChartConnector">
+            <a:avLst/>
+          </a:prstGeom>
+        </p:spPr>
+        <p:style>
+          <a:lnRef idx="2">
+            <a:schemeClr val="accent4">
+              <a:shade val="50000"/>
+            </a:schemeClr>
+          </a:lnRef>
+          <a:fillRef idx="1">
+            <a:schemeClr val="accent4"/>
+          </a:fillRef>
+          <a:effectRef idx="0">
+            <a:schemeClr val="accent4"/>
+          </a:effectRef>
+          <a:fontRef idx="minor">
+            <a:schemeClr val="lt1"/>
+          </a:fontRef>
+        </p:style>
+        <p:txBody>
+          <a:bodyPr rtlCol="0" anchor="ctr"/>
+          <a:lstStyle/>
+          <a:p>
+            <a:pPr algn="ctr"/>
+            <a:endParaRPr lang="en-US"/>
+          </a:p>
+        </p:txBody>
+      </p:sp>
+      <p:sp>
+        <p:nvSpPr>
+          <p:cNvPr id="6" name="Flowchart: Connector 5">
+            <a:extLst>
+              <a:ext uri="{FF2B5EF4-FFF2-40B4-BE49-F238E27FC236}">
+                <a16:creationId xmlns:a16="http://schemas.microsoft.com/office/drawing/2014/main" id="{573ED4FE-3B05-BBD4-0D2F-79A9D90FEF87}"/>
+              </a:ext>
+            </a:extLst>
+          </p:cNvPr>
+          <p:cNvSpPr/>
+          <p:nvPr/>
+        </p:nvSpPr>
+        <p:spPr>
+          <a:xfrm>
+            <a:off x="1764799" y="1798082"/>
+            <a:ext cx="722977" cy="736600"/>
+          </a:xfrm>
+          <a:prstGeom prst="flowChartConnector">
+            <a:avLst/>
+          </a:prstGeom>
+        </p:spPr>
+        <p:style>
+          <a:lnRef idx="2">
+            <a:schemeClr val="accent4">
+              <a:shade val="50000"/>
+            </a:schemeClr>
+          </a:lnRef>
+          <a:fillRef idx="1">
+            <a:schemeClr val="accent4"/>
+          </a:fillRef>
+          <a:effectRef idx="0">
+            <a:schemeClr val="accent4"/>
+          </a:effectRef>
+          <a:fontRef idx="minor">
+            <a:schemeClr val="lt1"/>
+          </a:fontRef>
+        </p:style>
+        <p:txBody>
+          <a:bodyPr rtlCol="0" anchor="ctr"/>
+          <a:lstStyle/>
+          <a:p>
+            <a:pPr algn="ctr"/>
+            <a:endParaRPr lang="en-US"/>
+          </a:p>
+        </p:txBody>
+      </p:sp>
+      <p:sp>
+        <p:nvSpPr>
+          <p:cNvPr id="7" name="Flowchart: Connector 6">
+            <a:extLst>
+              <a:ext uri="{FF2B5EF4-FFF2-40B4-BE49-F238E27FC236}">
+                <a16:creationId xmlns:a16="http://schemas.microsoft.com/office/drawing/2014/main" id="{6B7A3FC8-C673-A746-F091-B1D27730F27C}"/>
+              </a:ext>
+            </a:extLst>
+          </p:cNvPr>
+          <p:cNvSpPr/>
+          <p:nvPr/>
+        </p:nvSpPr>
+        <p:spPr>
+          <a:xfrm>
+            <a:off x="1495646" y="2616677"/>
+            <a:ext cx="647395" cy="634524"/>
+          </a:xfrm>
+          <a:prstGeom prst="flowChartConnector">
+            <a:avLst/>
+          </a:prstGeom>
+        </p:spPr>
+        <p:style>
+          <a:lnRef idx="2">
+            <a:schemeClr val="accent4">
+              <a:shade val="50000"/>
+            </a:schemeClr>
+          </a:lnRef>
+          <a:fillRef idx="1">
+            <a:schemeClr val="accent4"/>
+          </a:fillRef>
+          <a:effectRef idx="0">
+            <a:schemeClr val="accent4"/>
+          </a:effectRef>
+          <a:fontRef idx="minor">
+            <a:schemeClr val="lt1"/>
+          </a:fontRef>
+        </p:style>
+        <p:txBody>
+          <a:bodyPr rtlCol="0" anchor="ctr"/>
+          <a:lstStyle/>
+          <a:p>
+            <a:pPr algn="ctr"/>
+            <a:endParaRPr lang="en-US"/>
+          </a:p>
+        </p:txBody>
+      </p:sp>
+      <p:sp>
+        <p:nvSpPr>
+          <p:cNvPr id="8" name="Flowchart: Connector 7">
+            <a:extLst>
+              <a:ext uri="{FF2B5EF4-FFF2-40B4-BE49-F238E27FC236}">
+                <a16:creationId xmlns:a16="http://schemas.microsoft.com/office/drawing/2014/main" id="{2B5384EB-F4C9-558D-48CC-A592B978C7AF}"/>
+              </a:ext>
+            </a:extLst>
+          </p:cNvPr>
+          <p:cNvSpPr/>
+          <p:nvPr/>
+        </p:nvSpPr>
+        <p:spPr>
+          <a:xfrm>
+            <a:off x="1020896" y="2964419"/>
+            <a:ext cx="467360" cy="458788"/>
+          </a:xfrm>
+          <a:prstGeom prst="flowChartConnector">
+            <a:avLst/>
+          </a:prstGeom>
+        </p:spPr>
+        <p:style>
+          <a:lnRef idx="2">
+            <a:schemeClr val="accent4">
+              <a:shade val="50000"/>
+            </a:schemeClr>
+          </a:lnRef>
+          <a:fillRef idx="1">
+            <a:schemeClr val="accent4"/>
+          </a:fillRef>
+          <a:effectRef idx="0">
+            <a:schemeClr val="accent4"/>
+          </a:effectRef>
+          <a:fontRef idx="minor">
+            <a:schemeClr val="lt1"/>
+          </a:fontRef>
+        </p:style>
+        <p:txBody>
+          <a:bodyPr rtlCol="0" anchor="ctr"/>
+          <a:lstStyle/>
+          <a:p>
+            <a:pPr algn="ctr"/>
+            <a:endParaRPr lang="en-US"/>
+          </a:p>
+        </p:txBody>
+      </p:sp>
+      <p:sp>
+        <p:nvSpPr>
+          <p:cNvPr id="9" name="Flowchart: Connector 8">
+            <a:extLst>
+              <a:ext uri="{FF2B5EF4-FFF2-40B4-BE49-F238E27FC236}">
+                <a16:creationId xmlns:a16="http://schemas.microsoft.com/office/drawing/2014/main" id="{72022F33-2670-9A1A-17BF-EA0281F7CF85}"/>
+              </a:ext>
+            </a:extLst>
+          </p:cNvPr>
+          <p:cNvSpPr/>
+          <p:nvPr/>
+        </p:nvSpPr>
+        <p:spPr>
+          <a:xfrm>
+            <a:off x="1254576" y="3509010"/>
+            <a:ext cx="387584" cy="383540"/>
+          </a:xfrm>
+          <a:prstGeom prst="flowChartConnector">
+            <a:avLst/>
+          </a:prstGeom>
+        </p:spPr>
+        <p:style>
+          <a:lnRef idx="2">
+            <a:schemeClr val="accent4">
+              <a:shade val="50000"/>
+            </a:schemeClr>
+          </a:lnRef>
+          <a:fillRef idx="1">
+            <a:schemeClr val="accent4"/>
+          </a:fillRef>
+          <a:effectRef idx="0">
+            <a:schemeClr val="accent4"/>
+          </a:effectRef>
+          <a:fontRef idx="minor">
+            <a:schemeClr val="lt1"/>
+          </a:fontRef>
+        </p:style>
+        <p:txBody>
+          <a:bodyPr rtlCol="0" anchor="ctr"/>
+          <a:lstStyle/>
+          <a:p>
+            <a:pPr algn="ctr"/>
+            <a:endParaRPr lang="en-US"/>
+          </a:p>
+        </p:txBody>
+      </p:sp>
+      <p:sp>
+        <p:nvSpPr>
+          <p:cNvPr id="12" name="Content Placeholder 2">
+            <a:extLst>
+              <a:ext uri="{FF2B5EF4-FFF2-40B4-BE49-F238E27FC236}">
+                <a16:creationId xmlns:a16="http://schemas.microsoft.com/office/drawing/2014/main" id="{AF20B417-D7F3-5986-09FC-03736250533D}"/>
+              </a:ext>
+            </a:extLst>
+          </p:cNvPr>
+          <p:cNvSpPr txBox="1">
+            <a:spLocks/>
+          </p:cNvSpPr>
+          <p:nvPr/>
+        </p:nvSpPr>
+        <p:spPr>
+          <a:xfrm>
+            <a:off x="4093240" y="1716088"/>
+            <a:ext cx="7518621" cy="497520"/>
+          </a:xfrm>
+          <a:prstGeom prst="rect">
+            <a:avLst/>
+          </a:prstGeom>
+        </p:spPr>
+        <p:txBody>
+          <a:bodyPr anchor="b">
+            <a:normAutofit/>
+          </a:bodyPr>
+          <a:lstStyle>
+            <a:lvl1pPr marL="306000" indent="-306000" algn="l" defTabSz="457200" rtl="0" eaLnBrk="1" latinLnBrk="0" hangingPunct="1">
+              <a:spcBef>
+                <a:spcPct val="20000"/>
+              </a:spcBef>
+              <a:spcAft>
+                <a:spcPts val="600"/>
+              </a:spcAft>
+              <a:buClr>
+                <a:schemeClr val="accent2"/>
+              </a:buClr>
+              <a:buSzPct val="92000"/>
+              <a:buFont typeface="Wingdings 2" panose="05020102010507070707" pitchFamily="18" charset="2"/>
+              <a:buChar char=""/>
+              <a:defRPr sz="1800" kern="1200">
+                <a:solidFill>
+                  <a:schemeClr val="tx2"/>
+                </a:solidFill>
+                <a:latin typeface="+mn-lt"/>
+                <a:ea typeface="+mn-ea"/>
+                <a:cs typeface="+mn-cs"/>
+              </a:defRPr>
+            </a:lvl1pPr>
+            <a:lvl2pPr marL="630000" indent="-306000" algn="l" defTabSz="457200" rtl="0" eaLnBrk="1" latinLnBrk="0" hangingPunct="1">
+              <a:spcBef>
+                <a:spcPct val="20000"/>
+              </a:spcBef>
+              <a:spcAft>
+                <a:spcPts val="600"/>
+              </a:spcAft>
+              <a:buClr>
+                <a:schemeClr val="accent2"/>
+              </a:buClr>
+              <a:buSzPct val="92000"/>
+              <a:buFont typeface="Wingdings 2" panose="05020102010507070707" pitchFamily="18" charset="2"/>
+              <a:buChar char=""/>
+              <a:defRPr sz="1600" kern="1200">
+                <a:solidFill>
+                  <a:schemeClr val="tx2"/>
+                </a:solidFill>
+                <a:latin typeface="+mn-lt"/>
+                <a:ea typeface="+mn-ea"/>
+                <a:cs typeface="+mn-cs"/>
+              </a:defRPr>
+            </a:lvl2pPr>
+            <a:lvl3pPr marL="900000" indent="-270000" algn="l" defTabSz="457200" rtl="0" eaLnBrk="1" latinLnBrk="0" hangingPunct="1">
+              <a:spcBef>
+                <a:spcPct val="20000"/>
+              </a:spcBef>
+              <a:spcAft>
+                <a:spcPts val="600"/>
+              </a:spcAft>
+              <a:buClr>
+                <a:schemeClr val="accent2"/>
+              </a:buClr>
+              <a:buSzPct val="92000"/>
+              <a:buFont typeface="Wingdings 2" panose="05020102010507070707" pitchFamily="18" charset="2"/>
+              <a:buChar char=""/>
+              <a:defRPr sz="1400" kern="1200">
+                <a:solidFill>
+                  <a:schemeClr val="tx2"/>
+                </a:solidFill>
+                <a:latin typeface="+mn-lt"/>
+                <a:ea typeface="+mn-ea"/>
+                <a:cs typeface="+mn-cs"/>
+              </a:defRPr>
+            </a:lvl3pPr>
+            <a:lvl4pPr marL="1242000" indent="-234000" algn="l" defTabSz="457200" rtl="0" eaLnBrk="1" latinLnBrk="0" hangingPunct="1">
+              <a:spcBef>
+                <a:spcPct val="20000"/>
+              </a:spcBef>
+              <a:spcAft>
+                <a:spcPts val="600"/>
+              </a:spcAft>
+              <a:buClr>
+                <a:schemeClr val="accent2"/>
+              </a:buClr>
+              <a:buSzPct val="92000"/>
+              <a:buFont typeface="Wingdings 2" panose="05020102010507070707" pitchFamily="18" charset="2"/>
+              <a:buChar char=""/>
+              <a:defRPr sz="1200" kern="1200">
+                <a:solidFill>
+                  <a:schemeClr val="tx2"/>
+                </a:solidFill>
+                <a:latin typeface="+mn-lt"/>
+                <a:ea typeface="+mn-ea"/>
+                <a:cs typeface="+mn-cs"/>
+              </a:defRPr>
+            </a:lvl4pPr>
+            <a:lvl5pPr marL="1602000" indent="-234000" algn="l" defTabSz="457200" rtl="0" eaLnBrk="1" latinLnBrk="0" hangingPunct="1">
+              <a:spcBef>
+                <a:spcPct val="20000"/>
+              </a:spcBef>
+              <a:spcAft>
+                <a:spcPts val="600"/>
+              </a:spcAft>
+              <a:buClr>
+                <a:schemeClr val="accent2"/>
+              </a:buClr>
+              <a:buSzPct val="92000"/>
+              <a:buFont typeface="Wingdings 2" panose="05020102010507070707" pitchFamily="18" charset="2"/>
+              <a:buChar char=""/>
+              <a:defRPr sz="1200" kern="1200">
+                <a:solidFill>
+                  <a:schemeClr val="tx2"/>
+                </a:solidFill>
+                <a:latin typeface="+mn-lt"/>
+                <a:ea typeface="+mn-ea"/>
+                <a:cs typeface="+mn-cs"/>
+              </a:defRPr>
+            </a:lvl5pPr>
+            <a:lvl6pPr marL="1900000" indent="-228600" algn="l" defTabSz="457200" rtl="0" eaLnBrk="1" latinLnBrk="0" hangingPunct="1">
+              <a:spcBef>
+                <a:spcPct val="20000"/>
+              </a:spcBef>
+              <a:spcAft>
+                <a:spcPts val="600"/>
+              </a:spcAft>
+              <a:buClr>
+                <a:schemeClr val="accent2"/>
+              </a:buClr>
+              <a:buSzPct val="92000"/>
+              <a:buFont typeface="Wingdings 2" panose="05020102010507070707" pitchFamily="18" charset="2"/>
+              <a:buChar char=""/>
+              <a:defRPr sz="1200" kern="1200">
+                <a:solidFill>
+                  <a:schemeClr val="tx2"/>
+                </a:solidFill>
+                <a:latin typeface="+mn-lt"/>
+                <a:ea typeface="+mn-ea"/>
+                <a:cs typeface="+mn-cs"/>
+              </a:defRPr>
+            </a:lvl6pPr>
+            <a:lvl7pPr marL="2200000" indent="-228600" algn="l" defTabSz="457200" rtl="0" eaLnBrk="1" latinLnBrk="0" hangingPunct="1">
+              <a:spcBef>
+                <a:spcPct val="20000"/>
+              </a:spcBef>
+              <a:spcAft>
+                <a:spcPts val="600"/>
+              </a:spcAft>
+              <a:buClr>
+                <a:schemeClr val="accent2"/>
+              </a:buClr>
+              <a:buSzPct val="92000"/>
+              <a:buFont typeface="Wingdings 2" panose="05020102010507070707" pitchFamily="18" charset="2"/>
+              <a:buChar char=""/>
+              <a:defRPr sz="1200" kern="1200">
+                <a:solidFill>
+                  <a:schemeClr val="tx2"/>
+                </a:solidFill>
+                <a:latin typeface="+mn-lt"/>
+                <a:ea typeface="+mn-ea"/>
+                <a:cs typeface="+mn-cs"/>
+              </a:defRPr>
+            </a:lvl7pPr>
+            <a:lvl8pPr marL="2500000" indent="-228600" algn="l" defTabSz="457200" rtl="0" eaLnBrk="1" latinLnBrk="0" hangingPunct="1">
+              <a:spcBef>
+                <a:spcPct val="20000"/>
+              </a:spcBef>
+              <a:spcAft>
+                <a:spcPts val="600"/>
+              </a:spcAft>
+              <a:buClr>
+                <a:schemeClr val="accent2"/>
+              </a:buClr>
+              <a:buSzPct val="92000"/>
+              <a:buFont typeface="Wingdings 2" panose="05020102010507070707" pitchFamily="18" charset="2"/>
+              <a:buChar char=""/>
+              <a:defRPr sz="1200" kern="1200">
+                <a:solidFill>
+                  <a:schemeClr val="tx2"/>
+                </a:solidFill>
+                <a:latin typeface="+mn-lt"/>
+                <a:ea typeface="+mn-ea"/>
+                <a:cs typeface="+mn-cs"/>
+              </a:defRPr>
+            </a:lvl8pPr>
+            <a:lvl9pPr marL="2800000" indent="-228600" algn="l" defTabSz="457200" rtl="0" eaLnBrk="1" latinLnBrk="0" hangingPunct="1">
+              <a:spcBef>
+                <a:spcPct val="20000"/>
+              </a:spcBef>
+              <a:spcAft>
+                <a:spcPts val="600"/>
+              </a:spcAft>
+              <a:buClr>
+                <a:schemeClr val="accent2"/>
+              </a:buClr>
+              <a:buSzPct val="92000"/>
+              <a:buFont typeface="Wingdings 2" panose="05020102010507070707" pitchFamily="18" charset="2"/>
+              <a:buChar char=""/>
+              <a:defRPr sz="1200" kern="1200">
+                <a:solidFill>
+                  <a:schemeClr val="tx2"/>
+                </a:solidFill>
+                <a:latin typeface="+mn-lt"/>
+                <a:ea typeface="+mn-ea"/>
+                <a:cs typeface="+mn-cs"/>
+              </a:defRPr>
+            </a:lvl9pPr>
+          </a:lstStyle>
+          <a:p>
+            <a:pPr>
+              <a:buClr>
+                <a:schemeClr val="bg2"/>
+              </a:buClr>
+            </a:pPr>
+            <a:r>
+              <a:rPr lang="en-US" sz="2400" b="1" dirty="0">
+                <a:solidFill>
+                  <a:schemeClr val="accent6">
+                    <a:lumMod val="75000"/>
+                  </a:schemeClr>
+                </a:solidFill>
+              </a:rPr>
+              <a:t>Challenge:</a:t>
+            </a:r>
             <a:r>
               <a:rPr lang="en-US" sz="2000" dirty="0">
                 <a:solidFill>
-                  <a:schemeClr val="accent5">
-                    <a:lumMod val="20000"/>
-                    <a:lumOff val="80000"/>
+                  <a:schemeClr val="accent6">
+                    <a:lumMod val="75000"/>
                   </a:schemeClr>
                 </a:solidFill>
               </a:rPr>
-              <a:t>How did you overcome them? Or do to try to overcome them? [[This is the important part]]</a:t>
+              <a:t> Building SQL injection statements with the correct syntax</a:t>
+            </a:r>
+          </a:p>
+        </p:txBody>
+      </p:sp>
+      <p:sp>
+        <p:nvSpPr>
+          <p:cNvPr id="13" name="Content Placeholder 2">
+            <a:extLst>
+              <a:ext uri="{FF2B5EF4-FFF2-40B4-BE49-F238E27FC236}">
+                <a16:creationId xmlns:a16="http://schemas.microsoft.com/office/drawing/2014/main" id="{77A41FB2-DB80-1D96-BF82-B170C1640CFA}"/>
+              </a:ext>
+            </a:extLst>
+          </p:cNvPr>
+          <p:cNvSpPr txBox="1">
+            <a:spLocks/>
+          </p:cNvSpPr>
+          <p:nvPr/>
+        </p:nvSpPr>
+        <p:spPr>
+          <a:xfrm>
+            <a:off x="4093240" y="2226310"/>
+            <a:ext cx="7799828" cy="1094159"/>
+          </a:xfrm>
+          <a:prstGeom prst="rect">
+            <a:avLst/>
+          </a:prstGeom>
+        </p:spPr>
+        <p:txBody>
+          <a:bodyPr anchor="b">
+            <a:normAutofit/>
+          </a:bodyPr>
+          <a:lstStyle>
+            <a:lvl1pPr marL="306000" indent="-306000" algn="l" defTabSz="457200" rtl="0" eaLnBrk="1" latinLnBrk="0" hangingPunct="1">
+              <a:spcBef>
+                <a:spcPct val="20000"/>
+              </a:spcBef>
+              <a:spcAft>
+                <a:spcPts val="600"/>
+              </a:spcAft>
+              <a:buClr>
+                <a:schemeClr val="accent2"/>
+              </a:buClr>
+              <a:buSzPct val="92000"/>
+              <a:buFont typeface="Wingdings 2" panose="05020102010507070707" pitchFamily="18" charset="2"/>
+              <a:buChar char=""/>
+              <a:defRPr sz="1800" kern="1200">
+                <a:solidFill>
+                  <a:schemeClr val="tx2"/>
+                </a:solidFill>
+                <a:latin typeface="+mn-lt"/>
+                <a:ea typeface="+mn-ea"/>
+                <a:cs typeface="+mn-cs"/>
+              </a:defRPr>
+            </a:lvl1pPr>
+            <a:lvl2pPr marL="630000" indent="-306000" algn="l" defTabSz="457200" rtl="0" eaLnBrk="1" latinLnBrk="0" hangingPunct="1">
+              <a:spcBef>
+                <a:spcPct val="20000"/>
+              </a:spcBef>
+              <a:spcAft>
+                <a:spcPts val="600"/>
+              </a:spcAft>
+              <a:buClr>
+                <a:schemeClr val="accent2"/>
+              </a:buClr>
+              <a:buSzPct val="92000"/>
+              <a:buFont typeface="Wingdings 2" panose="05020102010507070707" pitchFamily="18" charset="2"/>
+              <a:buChar char=""/>
+              <a:defRPr sz="1600" kern="1200">
+                <a:solidFill>
+                  <a:schemeClr val="tx2"/>
+                </a:solidFill>
+                <a:latin typeface="+mn-lt"/>
+                <a:ea typeface="+mn-ea"/>
+                <a:cs typeface="+mn-cs"/>
+              </a:defRPr>
+            </a:lvl2pPr>
+            <a:lvl3pPr marL="900000" indent="-270000" algn="l" defTabSz="457200" rtl="0" eaLnBrk="1" latinLnBrk="0" hangingPunct="1">
+              <a:spcBef>
+                <a:spcPct val="20000"/>
+              </a:spcBef>
+              <a:spcAft>
+                <a:spcPts val="600"/>
+              </a:spcAft>
+              <a:buClr>
+                <a:schemeClr val="accent2"/>
+              </a:buClr>
+              <a:buSzPct val="92000"/>
+              <a:buFont typeface="Wingdings 2" panose="05020102010507070707" pitchFamily="18" charset="2"/>
+              <a:buChar char=""/>
+              <a:defRPr sz="1400" kern="1200">
+                <a:solidFill>
+                  <a:schemeClr val="tx2"/>
+                </a:solidFill>
+                <a:latin typeface="+mn-lt"/>
+                <a:ea typeface="+mn-ea"/>
+                <a:cs typeface="+mn-cs"/>
+              </a:defRPr>
+            </a:lvl3pPr>
+            <a:lvl4pPr marL="1242000" indent="-234000" algn="l" defTabSz="457200" rtl="0" eaLnBrk="1" latinLnBrk="0" hangingPunct="1">
+              <a:spcBef>
+                <a:spcPct val="20000"/>
+              </a:spcBef>
+              <a:spcAft>
+                <a:spcPts val="600"/>
+              </a:spcAft>
+              <a:buClr>
+                <a:schemeClr val="accent2"/>
+              </a:buClr>
+              <a:buSzPct val="92000"/>
+              <a:buFont typeface="Wingdings 2" panose="05020102010507070707" pitchFamily="18" charset="2"/>
+              <a:buChar char=""/>
+              <a:defRPr sz="1200" kern="1200">
+                <a:solidFill>
+                  <a:schemeClr val="tx2"/>
+                </a:solidFill>
+                <a:latin typeface="+mn-lt"/>
+                <a:ea typeface="+mn-ea"/>
+                <a:cs typeface="+mn-cs"/>
+              </a:defRPr>
+            </a:lvl4pPr>
+            <a:lvl5pPr marL="1602000" indent="-234000" algn="l" defTabSz="457200" rtl="0" eaLnBrk="1" latinLnBrk="0" hangingPunct="1">
+              <a:spcBef>
+                <a:spcPct val="20000"/>
+              </a:spcBef>
+              <a:spcAft>
+                <a:spcPts val="600"/>
+              </a:spcAft>
+              <a:buClr>
+                <a:schemeClr val="accent2"/>
+              </a:buClr>
+              <a:buSzPct val="92000"/>
+              <a:buFont typeface="Wingdings 2" panose="05020102010507070707" pitchFamily="18" charset="2"/>
+              <a:buChar char=""/>
+              <a:defRPr sz="1200" kern="1200">
+                <a:solidFill>
+                  <a:schemeClr val="tx2"/>
+                </a:solidFill>
+                <a:latin typeface="+mn-lt"/>
+                <a:ea typeface="+mn-ea"/>
+                <a:cs typeface="+mn-cs"/>
+              </a:defRPr>
+            </a:lvl5pPr>
+            <a:lvl6pPr marL="1900000" indent="-228600" algn="l" defTabSz="457200" rtl="0" eaLnBrk="1" latinLnBrk="0" hangingPunct="1">
+              <a:spcBef>
+                <a:spcPct val="20000"/>
+              </a:spcBef>
+              <a:spcAft>
+                <a:spcPts val="600"/>
+              </a:spcAft>
+              <a:buClr>
+                <a:schemeClr val="accent2"/>
+              </a:buClr>
+              <a:buSzPct val="92000"/>
+              <a:buFont typeface="Wingdings 2" panose="05020102010507070707" pitchFamily="18" charset="2"/>
+              <a:buChar char=""/>
+              <a:defRPr sz="1200" kern="1200">
+                <a:solidFill>
+                  <a:schemeClr val="tx2"/>
+                </a:solidFill>
+                <a:latin typeface="+mn-lt"/>
+                <a:ea typeface="+mn-ea"/>
+                <a:cs typeface="+mn-cs"/>
+              </a:defRPr>
+            </a:lvl6pPr>
+            <a:lvl7pPr marL="2200000" indent="-228600" algn="l" defTabSz="457200" rtl="0" eaLnBrk="1" latinLnBrk="0" hangingPunct="1">
+              <a:spcBef>
+                <a:spcPct val="20000"/>
+              </a:spcBef>
+              <a:spcAft>
+                <a:spcPts val="600"/>
+              </a:spcAft>
+              <a:buClr>
+                <a:schemeClr val="accent2"/>
+              </a:buClr>
+              <a:buSzPct val="92000"/>
+              <a:buFont typeface="Wingdings 2" panose="05020102010507070707" pitchFamily="18" charset="2"/>
+              <a:buChar char=""/>
+              <a:defRPr sz="1200" kern="1200">
+                <a:solidFill>
+                  <a:schemeClr val="tx2"/>
+                </a:solidFill>
+                <a:latin typeface="+mn-lt"/>
+                <a:ea typeface="+mn-ea"/>
+                <a:cs typeface="+mn-cs"/>
+              </a:defRPr>
+            </a:lvl7pPr>
+            <a:lvl8pPr marL="2500000" indent="-228600" algn="l" defTabSz="457200" rtl="0" eaLnBrk="1" latinLnBrk="0" hangingPunct="1">
+              <a:spcBef>
+                <a:spcPct val="20000"/>
+              </a:spcBef>
+              <a:spcAft>
+                <a:spcPts val="600"/>
+              </a:spcAft>
+              <a:buClr>
+                <a:schemeClr val="accent2"/>
+              </a:buClr>
+              <a:buSzPct val="92000"/>
+              <a:buFont typeface="Wingdings 2" panose="05020102010507070707" pitchFamily="18" charset="2"/>
+              <a:buChar char=""/>
+              <a:defRPr sz="1200" kern="1200">
+                <a:solidFill>
+                  <a:schemeClr val="tx2"/>
+                </a:solidFill>
+                <a:latin typeface="+mn-lt"/>
+                <a:ea typeface="+mn-ea"/>
+                <a:cs typeface="+mn-cs"/>
+              </a:defRPr>
+            </a:lvl8pPr>
+            <a:lvl9pPr marL="2800000" indent="-228600" algn="l" defTabSz="457200" rtl="0" eaLnBrk="1" latinLnBrk="0" hangingPunct="1">
+              <a:spcBef>
+                <a:spcPct val="20000"/>
+              </a:spcBef>
+              <a:spcAft>
+                <a:spcPts val="600"/>
+              </a:spcAft>
+              <a:buClr>
+                <a:schemeClr val="accent2"/>
+              </a:buClr>
+              <a:buSzPct val="92000"/>
+              <a:buFont typeface="Wingdings 2" panose="05020102010507070707" pitchFamily="18" charset="2"/>
+              <a:buChar char=""/>
+              <a:defRPr sz="1200" kern="1200">
+                <a:solidFill>
+                  <a:schemeClr val="tx2"/>
+                </a:solidFill>
+                <a:latin typeface="+mn-lt"/>
+                <a:ea typeface="+mn-ea"/>
+                <a:cs typeface="+mn-cs"/>
+              </a:defRPr>
+            </a:lvl9pPr>
+          </a:lstStyle>
+          <a:p>
+            <a:pPr>
+              <a:buClr>
+                <a:schemeClr val="bg2"/>
+              </a:buClr>
+            </a:pPr>
+            <a:r>
+              <a:rPr lang="en-US" sz="2400" b="1" dirty="0">
+                <a:solidFill>
+                  <a:schemeClr val="accent6">
+                    <a:lumMod val="75000"/>
+                  </a:schemeClr>
+                </a:solidFill>
+              </a:rPr>
+              <a:t>How to Overcome:</a:t>
+            </a:r>
+            <a:r>
+              <a:rPr lang="en-US" sz="2000" b="1" dirty="0">
+                <a:solidFill>
+                  <a:schemeClr val="accent6">
+                    <a:lumMod val="75000"/>
+                  </a:schemeClr>
+                </a:solidFill>
+              </a:rPr>
+              <a:t> </a:t>
+            </a:r>
+            <a:r>
+              <a:rPr lang="en-US" sz="2000" dirty="0">
+                <a:solidFill>
+                  <a:schemeClr val="accent6">
+                    <a:lumMod val="75000"/>
+                  </a:schemeClr>
+                </a:solidFill>
+              </a:rPr>
+              <a:t>Thinking from the perspective of an attacker and thinking about the greater context that the user information is getting inserted into</a:t>
+            </a:r>
+          </a:p>
+        </p:txBody>
+      </p:sp>
+      <p:sp>
+        <p:nvSpPr>
+          <p:cNvPr id="14" name="Content Placeholder 2">
+            <a:extLst>
+              <a:ext uri="{FF2B5EF4-FFF2-40B4-BE49-F238E27FC236}">
+                <a16:creationId xmlns:a16="http://schemas.microsoft.com/office/drawing/2014/main" id="{34E7A6FA-399D-ECF2-CB81-00A6B03C92B8}"/>
+              </a:ext>
+            </a:extLst>
+          </p:cNvPr>
+          <p:cNvSpPr txBox="1">
+            <a:spLocks/>
+          </p:cNvSpPr>
+          <p:nvPr/>
+        </p:nvSpPr>
+        <p:spPr>
+          <a:xfrm>
+            <a:off x="4093240" y="3289616"/>
+            <a:ext cx="7856662" cy="753653"/>
+          </a:xfrm>
+          <a:prstGeom prst="rect">
+            <a:avLst/>
+          </a:prstGeom>
+        </p:spPr>
+        <p:txBody>
+          <a:bodyPr anchor="b">
+            <a:normAutofit lnSpcReduction="10000"/>
+          </a:bodyPr>
+          <a:lstStyle>
+            <a:lvl1pPr marL="306000" indent="-306000" algn="l" defTabSz="457200" rtl="0" eaLnBrk="1" latinLnBrk="0" hangingPunct="1">
+              <a:spcBef>
+                <a:spcPct val="20000"/>
+              </a:spcBef>
+              <a:spcAft>
+                <a:spcPts val="600"/>
+              </a:spcAft>
+              <a:buClr>
+                <a:schemeClr val="accent2"/>
+              </a:buClr>
+              <a:buSzPct val="92000"/>
+              <a:buFont typeface="Wingdings 2" panose="05020102010507070707" pitchFamily="18" charset="2"/>
+              <a:buChar char=""/>
+              <a:defRPr sz="1800" kern="1200">
+                <a:solidFill>
+                  <a:schemeClr val="tx2"/>
+                </a:solidFill>
+                <a:latin typeface="+mn-lt"/>
+                <a:ea typeface="+mn-ea"/>
+                <a:cs typeface="+mn-cs"/>
+              </a:defRPr>
+            </a:lvl1pPr>
+            <a:lvl2pPr marL="630000" indent="-306000" algn="l" defTabSz="457200" rtl="0" eaLnBrk="1" latinLnBrk="0" hangingPunct="1">
+              <a:spcBef>
+                <a:spcPct val="20000"/>
+              </a:spcBef>
+              <a:spcAft>
+                <a:spcPts val="600"/>
+              </a:spcAft>
+              <a:buClr>
+                <a:schemeClr val="accent2"/>
+              </a:buClr>
+              <a:buSzPct val="92000"/>
+              <a:buFont typeface="Wingdings 2" panose="05020102010507070707" pitchFamily="18" charset="2"/>
+              <a:buChar char=""/>
+              <a:defRPr sz="1600" kern="1200">
+                <a:solidFill>
+                  <a:schemeClr val="tx2"/>
+                </a:solidFill>
+                <a:latin typeface="+mn-lt"/>
+                <a:ea typeface="+mn-ea"/>
+                <a:cs typeface="+mn-cs"/>
+              </a:defRPr>
+            </a:lvl2pPr>
+            <a:lvl3pPr marL="900000" indent="-270000" algn="l" defTabSz="457200" rtl="0" eaLnBrk="1" latinLnBrk="0" hangingPunct="1">
+              <a:spcBef>
+                <a:spcPct val="20000"/>
+              </a:spcBef>
+              <a:spcAft>
+                <a:spcPts val="600"/>
+              </a:spcAft>
+              <a:buClr>
+                <a:schemeClr val="accent2"/>
+              </a:buClr>
+              <a:buSzPct val="92000"/>
+              <a:buFont typeface="Wingdings 2" panose="05020102010507070707" pitchFamily="18" charset="2"/>
+              <a:buChar char=""/>
+              <a:defRPr sz="1400" kern="1200">
+                <a:solidFill>
+                  <a:schemeClr val="tx2"/>
+                </a:solidFill>
+                <a:latin typeface="+mn-lt"/>
+                <a:ea typeface="+mn-ea"/>
+                <a:cs typeface="+mn-cs"/>
+              </a:defRPr>
+            </a:lvl3pPr>
+            <a:lvl4pPr marL="1242000" indent="-234000" algn="l" defTabSz="457200" rtl="0" eaLnBrk="1" latinLnBrk="0" hangingPunct="1">
+              <a:spcBef>
+                <a:spcPct val="20000"/>
+              </a:spcBef>
+              <a:spcAft>
+                <a:spcPts val="600"/>
+              </a:spcAft>
+              <a:buClr>
+                <a:schemeClr val="accent2"/>
+              </a:buClr>
+              <a:buSzPct val="92000"/>
+              <a:buFont typeface="Wingdings 2" panose="05020102010507070707" pitchFamily="18" charset="2"/>
+              <a:buChar char=""/>
+              <a:defRPr sz="1200" kern="1200">
+                <a:solidFill>
+                  <a:schemeClr val="tx2"/>
+                </a:solidFill>
+                <a:latin typeface="+mn-lt"/>
+                <a:ea typeface="+mn-ea"/>
+                <a:cs typeface="+mn-cs"/>
+              </a:defRPr>
+            </a:lvl4pPr>
+            <a:lvl5pPr marL="1602000" indent="-234000" algn="l" defTabSz="457200" rtl="0" eaLnBrk="1" latinLnBrk="0" hangingPunct="1">
+              <a:spcBef>
+                <a:spcPct val="20000"/>
+              </a:spcBef>
+              <a:spcAft>
+                <a:spcPts val="600"/>
+              </a:spcAft>
+              <a:buClr>
+                <a:schemeClr val="accent2"/>
+              </a:buClr>
+              <a:buSzPct val="92000"/>
+              <a:buFont typeface="Wingdings 2" panose="05020102010507070707" pitchFamily="18" charset="2"/>
+              <a:buChar char=""/>
+              <a:defRPr sz="1200" kern="1200">
+                <a:solidFill>
+                  <a:schemeClr val="tx2"/>
+                </a:solidFill>
+                <a:latin typeface="+mn-lt"/>
+                <a:ea typeface="+mn-ea"/>
+                <a:cs typeface="+mn-cs"/>
+              </a:defRPr>
+            </a:lvl5pPr>
+            <a:lvl6pPr marL="1900000" indent="-228600" algn="l" defTabSz="457200" rtl="0" eaLnBrk="1" latinLnBrk="0" hangingPunct="1">
+              <a:spcBef>
+                <a:spcPct val="20000"/>
+              </a:spcBef>
+              <a:spcAft>
+                <a:spcPts val="600"/>
+              </a:spcAft>
+              <a:buClr>
+                <a:schemeClr val="accent2"/>
+              </a:buClr>
+              <a:buSzPct val="92000"/>
+              <a:buFont typeface="Wingdings 2" panose="05020102010507070707" pitchFamily="18" charset="2"/>
+              <a:buChar char=""/>
+              <a:defRPr sz="1200" kern="1200">
+                <a:solidFill>
+                  <a:schemeClr val="tx2"/>
+                </a:solidFill>
+                <a:latin typeface="+mn-lt"/>
+                <a:ea typeface="+mn-ea"/>
+                <a:cs typeface="+mn-cs"/>
+              </a:defRPr>
+            </a:lvl6pPr>
+            <a:lvl7pPr marL="2200000" indent="-228600" algn="l" defTabSz="457200" rtl="0" eaLnBrk="1" latinLnBrk="0" hangingPunct="1">
+              <a:spcBef>
+                <a:spcPct val="20000"/>
+              </a:spcBef>
+              <a:spcAft>
+                <a:spcPts val="600"/>
+              </a:spcAft>
+              <a:buClr>
+                <a:schemeClr val="accent2"/>
+              </a:buClr>
+              <a:buSzPct val="92000"/>
+              <a:buFont typeface="Wingdings 2" panose="05020102010507070707" pitchFamily="18" charset="2"/>
+              <a:buChar char=""/>
+              <a:defRPr sz="1200" kern="1200">
+                <a:solidFill>
+                  <a:schemeClr val="tx2"/>
+                </a:solidFill>
+                <a:latin typeface="+mn-lt"/>
+                <a:ea typeface="+mn-ea"/>
+                <a:cs typeface="+mn-cs"/>
+              </a:defRPr>
+            </a:lvl7pPr>
+            <a:lvl8pPr marL="2500000" indent="-228600" algn="l" defTabSz="457200" rtl="0" eaLnBrk="1" latinLnBrk="0" hangingPunct="1">
+              <a:spcBef>
+                <a:spcPct val="20000"/>
+              </a:spcBef>
+              <a:spcAft>
+                <a:spcPts val="600"/>
+              </a:spcAft>
+              <a:buClr>
+                <a:schemeClr val="accent2"/>
+              </a:buClr>
+              <a:buSzPct val="92000"/>
+              <a:buFont typeface="Wingdings 2" panose="05020102010507070707" pitchFamily="18" charset="2"/>
+              <a:buChar char=""/>
+              <a:defRPr sz="1200" kern="1200">
+                <a:solidFill>
+                  <a:schemeClr val="tx2"/>
+                </a:solidFill>
+                <a:latin typeface="+mn-lt"/>
+                <a:ea typeface="+mn-ea"/>
+                <a:cs typeface="+mn-cs"/>
+              </a:defRPr>
+            </a:lvl8pPr>
+            <a:lvl9pPr marL="2800000" indent="-228600" algn="l" defTabSz="457200" rtl="0" eaLnBrk="1" latinLnBrk="0" hangingPunct="1">
+              <a:spcBef>
+                <a:spcPct val="20000"/>
+              </a:spcBef>
+              <a:spcAft>
+                <a:spcPts val="600"/>
+              </a:spcAft>
+              <a:buClr>
+                <a:schemeClr val="accent2"/>
+              </a:buClr>
+              <a:buSzPct val="92000"/>
+              <a:buFont typeface="Wingdings 2" panose="05020102010507070707" pitchFamily="18" charset="2"/>
+              <a:buChar char=""/>
+              <a:defRPr sz="1200" kern="1200">
+                <a:solidFill>
+                  <a:schemeClr val="tx2"/>
+                </a:solidFill>
+                <a:latin typeface="+mn-lt"/>
+                <a:ea typeface="+mn-ea"/>
+                <a:cs typeface="+mn-cs"/>
+              </a:defRPr>
+            </a:lvl9pPr>
+          </a:lstStyle>
+          <a:p>
+            <a:pPr>
+              <a:buClr>
+                <a:schemeClr val="bg2"/>
+              </a:buClr>
+            </a:pPr>
+            <a:r>
+              <a:rPr lang="en-US" sz="2400" b="1" dirty="0">
+                <a:solidFill>
+                  <a:schemeClr val="accent6">
+                    <a:lumMod val="75000"/>
+                  </a:schemeClr>
+                </a:solidFill>
+              </a:rPr>
+              <a:t>Challenge:</a:t>
+            </a:r>
+            <a:r>
+              <a:rPr lang="en-US" sz="2000" dirty="0">
+                <a:solidFill>
+                  <a:schemeClr val="accent6">
+                    <a:lumMod val="75000"/>
+                  </a:schemeClr>
+                </a:solidFill>
+              </a:rPr>
+              <a:t> Getting our site and database to work for both of us across both Linux and Windows</a:t>
             </a:r>
           </a:p>
         </p:txBody>
@@ -5245,7 +7355,7 @@
     </p:spTree>
     <p:extLst>
       <p:ext uri="{BB962C8B-B14F-4D97-AF65-F5344CB8AC3E}">
-        <p14:creationId xmlns:p14="http://schemas.microsoft.com/office/powerpoint/2010/main" val="531914396"/>
+        <p14:creationId xmlns:p14="http://schemas.microsoft.com/office/powerpoint/2010/main" val="3844387003"/>
       </p:ext>
     </p:extLst>
   </p:cSld>
@@ -5258,6 +7368,14 @@
 <file path=ppt/slides/slide5.xml><?xml version="1.0" encoding="utf-8"?>
 <p:sld xmlns:a="http://schemas.openxmlformats.org/drawingml/2006/main" xmlns:r="http://schemas.openxmlformats.org/officeDocument/2006/relationships" xmlns:p="http://schemas.openxmlformats.org/presentationml/2006/main">
   <p:cSld>
+    <p:bg>
+      <p:bgPr>
+        <a:solidFill>
+          <a:srgbClr val="FFDE59"/>
+        </a:solidFill>
+        <a:effectLst/>
+      </p:bgPr>
+    </p:bg>
     <p:spTree>
       <p:nvGrpSpPr>
         <p:cNvPr id="1" name=""/>
@@ -5274,26 +7392,103 @@
       </p:grpSpPr>
       <p:sp>
         <p:nvSpPr>
-          <p:cNvPr id="2" name="Title 1">
+          <p:cNvPr id="10" name="Title 1">
             <a:extLst>
               <a:ext uri="{FF2B5EF4-FFF2-40B4-BE49-F238E27FC236}">
-                <a16:creationId xmlns:a16="http://schemas.microsoft.com/office/drawing/2014/main" id="{047DC0BE-02CD-7543-A351-030147D3ECB7}"/>
+                <a16:creationId xmlns:a16="http://schemas.microsoft.com/office/drawing/2014/main" id="{9CB5705E-802B-B72E-D8B9-EC552F6249C5}"/>
               </a:ext>
             </a:extLst>
           </p:cNvPr>
-          <p:cNvSpPr>
-            <a:spLocks noGrp="1"/>
-          </p:cNvSpPr>
-          <p:nvPr>
-            <p:ph type="title"/>
-          </p:nvPr>
-        </p:nvSpPr>
-        <p:spPr/>
-        <p:txBody>
-          <a:bodyPr>
+          <p:cNvSpPr txBox="1">
+            <a:spLocks/>
+          </p:cNvSpPr>
+          <p:nvPr/>
+        </p:nvSpPr>
+        <p:spPr>
+          <a:xfrm>
+            <a:off x="581192" y="701675"/>
+            <a:ext cx="11029950" cy="1014413"/>
+          </a:xfrm>
+          <a:prstGeom prst="rect">
+            <a:avLst/>
+          </a:prstGeom>
+        </p:spPr>
+        <p:txBody>
+          <a:bodyPr vert="horz" lIns="91440" tIns="45720" rIns="91440" bIns="45720" rtlCol="0" anchor="b">
             <a:normAutofit/>
           </a:bodyPr>
-          <a:lstStyle/>
+          <a:lstStyle>
+            <a:lvl1pPr algn="l" defTabSz="457200" rtl="0" eaLnBrk="1" latinLnBrk="0" hangingPunct="1">
+              <a:spcBef>
+                <a:spcPct val="0"/>
+              </a:spcBef>
+              <a:buNone/>
+              <a:defRPr sz="2800" b="0" kern="1200" cap="all">
+                <a:solidFill>
+                  <a:schemeClr val="bg1"/>
+                </a:solidFill>
+                <a:latin typeface="+mj-lt"/>
+                <a:ea typeface="+mj-ea"/>
+                <a:cs typeface="+mj-cs"/>
+              </a:defRPr>
+            </a:lvl1pPr>
+            <a:lvl2pPr eaLnBrk="1" hangingPunct="1">
+              <a:defRPr>
+                <a:solidFill>
+                  <a:schemeClr val="tx2"/>
+                </a:solidFill>
+              </a:defRPr>
+            </a:lvl2pPr>
+            <a:lvl3pPr eaLnBrk="1" hangingPunct="1">
+              <a:defRPr>
+                <a:solidFill>
+                  <a:schemeClr val="tx2"/>
+                </a:solidFill>
+              </a:defRPr>
+            </a:lvl3pPr>
+            <a:lvl4pPr eaLnBrk="1" hangingPunct="1">
+              <a:defRPr>
+                <a:solidFill>
+                  <a:schemeClr val="tx2"/>
+                </a:solidFill>
+              </a:defRPr>
+            </a:lvl4pPr>
+            <a:lvl5pPr eaLnBrk="1" hangingPunct="1">
+              <a:defRPr>
+                <a:solidFill>
+                  <a:schemeClr val="tx2"/>
+                </a:solidFill>
+              </a:defRPr>
+            </a:lvl5pPr>
+            <a:lvl6pPr eaLnBrk="1" hangingPunct="1">
+              <a:defRPr>
+                <a:solidFill>
+                  <a:schemeClr val="tx2"/>
+                </a:solidFill>
+              </a:defRPr>
+            </a:lvl6pPr>
+            <a:lvl7pPr eaLnBrk="1" hangingPunct="1">
+              <a:defRPr>
+                <a:solidFill>
+                  <a:schemeClr val="tx2"/>
+                </a:solidFill>
+              </a:defRPr>
+            </a:lvl7pPr>
+            <a:lvl8pPr eaLnBrk="1" hangingPunct="1">
+              <a:defRPr>
+                <a:solidFill>
+                  <a:schemeClr val="tx2"/>
+                </a:solidFill>
+              </a:defRPr>
+            </a:lvl8pPr>
+            <a:lvl9pPr eaLnBrk="1" hangingPunct="1">
+              <a:defRPr>
+                <a:solidFill>
+                  <a:schemeClr val="tx2"/>
+                </a:solidFill>
+              </a:defRPr>
+            </a:lvl9pPr>
+          </a:lstStyle>
           <a:p>
             <a:r>
               <a:rPr lang="en-US" sz="4000" b="1"/>
@@ -5305,57 +7500,260 @@
       </p:sp>
       <p:sp>
         <p:nvSpPr>
-          <p:cNvPr id="3" name="Content Placeholder 2">
+          <p:cNvPr id="11" name="Content Placeholder 2">
             <a:extLst>
               <a:ext uri="{FF2B5EF4-FFF2-40B4-BE49-F238E27FC236}">
-                <a16:creationId xmlns:a16="http://schemas.microsoft.com/office/drawing/2014/main" id="{7D577D21-C1ED-0642-9DCC-779D948BB521}"/>
+                <a16:creationId xmlns:a16="http://schemas.microsoft.com/office/drawing/2014/main" id="{F622C2CB-7279-72CE-1653-43FD86C8DA37}"/>
               </a:ext>
             </a:extLst>
           </p:cNvPr>
-          <p:cNvSpPr>
-            <a:spLocks noGrp="1"/>
-          </p:cNvSpPr>
-          <p:nvPr>
-            <p:ph idx="1"/>
-          </p:nvPr>
-        </p:nvSpPr>
-        <p:spPr/>
-        <p:txBody>
-          <a:bodyPr>
-            <a:normAutofit fontScale="92500" lnSpcReduction="10000"/>
+          <p:cNvSpPr txBox="1">
+            <a:spLocks/>
+          </p:cNvSpPr>
+          <p:nvPr/>
+        </p:nvSpPr>
+        <p:spPr>
+          <a:xfrm>
+            <a:off x="581192" y="1645920"/>
+            <a:ext cx="5601168" cy="4932680"/>
+          </a:xfrm>
+          <a:prstGeom prst="rect">
+            <a:avLst/>
+          </a:prstGeom>
+        </p:spPr>
+        <p:txBody>
+          <a:bodyPr vert="horz" lIns="91440" tIns="45720" rIns="91440" bIns="45720" rtlCol="0" anchor="ctr">
+            <a:normAutofit/>
           </a:bodyPr>
-          <a:lstStyle/>
-          <a:p>
-            <a:r>
-              <a:rPr lang="en-US" strike="sngStrike" dirty="0">
-                <a:solidFill>
-                  <a:schemeClr val="accent5">
-                    <a:lumMod val="20000"/>
-                    <a:lumOff val="80000"/>
+          <a:lstStyle>
+            <a:lvl1pPr marL="306000" indent="-306000" algn="l" defTabSz="457200" rtl="0" eaLnBrk="1" latinLnBrk="0" hangingPunct="1">
+              <a:spcBef>
+                <a:spcPct val="20000"/>
+              </a:spcBef>
+              <a:spcAft>
+                <a:spcPts val="600"/>
+              </a:spcAft>
+              <a:buClr>
+                <a:schemeClr val="accent2"/>
+              </a:buClr>
+              <a:buSzPct val="92000"/>
+              <a:buFont typeface="Wingdings 2" panose="05020102010507070707" pitchFamily="18" charset="2"/>
+              <a:buChar char=""/>
+              <a:defRPr sz="1800" kern="1200">
+                <a:solidFill>
+                  <a:schemeClr val="tx2"/>
+                </a:solidFill>
+                <a:latin typeface="+mn-lt"/>
+                <a:ea typeface="+mn-ea"/>
+                <a:cs typeface="+mn-cs"/>
+              </a:defRPr>
+            </a:lvl1pPr>
+            <a:lvl2pPr marL="630000" indent="-306000" algn="l" defTabSz="457200" rtl="0" eaLnBrk="1" latinLnBrk="0" hangingPunct="1">
+              <a:spcBef>
+                <a:spcPct val="20000"/>
+              </a:spcBef>
+              <a:spcAft>
+                <a:spcPts val="600"/>
+              </a:spcAft>
+              <a:buClr>
+                <a:schemeClr val="accent2"/>
+              </a:buClr>
+              <a:buSzPct val="92000"/>
+              <a:buFont typeface="Wingdings 2" panose="05020102010507070707" pitchFamily="18" charset="2"/>
+              <a:buChar char=""/>
+              <a:defRPr sz="1600" kern="1200">
+                <a:solidFill>
+                  <a:schemeClr val="tx2"/>
+                </a:solidFill>
+                <a:latin typeface="+mn-lt"/>
+                <a:ea typeface="+mn-ea"/>
+                <a:cs typeface="+mn-cs"/>
+              </a:defRPr>
+            </a:lvl2pPr>
+            <a:lvl3pPr marL="900000" indent="-270000" algn="l" defTabSz="457200" rtl="0" eaLnBrk="1" latinLnBrk="0" hangingPunct="1">
+              <a:spcBef>
+                <a:spcPct val="20000"/>
+              </a:spcBef>
+              <a:spcAft>
+                <a:spcPts val="600"/>
+              </a:spcAft>
+              <a:buClr>
+                <a:schemeClr val="accent2"/>
+              </a:buClr>
+              <a:buSzPct val="92000"/>
+              <a:buFont typeface="Wingdings 2" panose="05020102010507070707" pitchFamily="18" charset="2"/>
+              <a:buChar char=""/>
+              <a:defRPr sz="1400" kern="1200">
+                <a:solidFill>
+                  <a:schemeClr val="tx2"/>
+                </a:solidFill>
+                <a:latin typeface="+mn-lt"/>
+                <a:ea typeface="+mn-ea"/>
+                <a:cs typeface="+mn-cs"/>
+              </a:defRPr>
+            </a:lvl3pPr>
+            <a:lvl4pPr marL="1242000" indent="-234000" algn="l" defTabSz="457200" rtl="0" eaLnBrk="1" latinLnBrk="0" hangingPunct="1">
+              <a:spcBef>
+                <a:spcPct val="20000"/>
+              </a:spcBef>
+              <a:spcAft>
+                <a:spcPts val="600"/>
+              </a:spcAft>
+              <a:buClr>
+                <a:schemeClr val="accent2"/>
+              </a:buClr>
+              <a:buSzPct val="92000"/>
+              <a:buFont typeface="Wingdings 2" panose="05020102010507070707" pitchFamily="18" charset="2"/>
+              <a:buChar char=""/>
+              <a:defRPr sz="1200" kern="1200">
+                <a:solidFill>
+                  <a:schemeClr val="tx2"/>
+                </a:solidFill>
+                <a:latin typeface="+mn-lt"/>
+                <a:ea typeface="+mn-ea"/>
+                <a:cs typeface="+mn-cs"/>
+              </a:defRPr>
+            </a:lvl4pPr>
+            <a:lvl5pPr marL="1602000" indent="-234000" algn="l" defTabSz="457200" rtl="0" eaLnBrk="1" latinLnBrk="0" hangingPunct="1">
+              <a:spcBef>
+                <a:spcPct val="20000"/>
+              </a:spcBef>
+              <a:spcAft>
+                <a:spcPts val="600"/>
+              </a:spcAft>
+              <a:buClr>
+                <a:schemeClr val="accent2"/>
+              </a:buClr>
+              <a:buSzPct val="92000"/>
+              <a:buFont typeface="Wingdings 2" panose="05020102010507070707" pitchFamily="18" charset="2"/>
+              <a:buChar char=""/>
+              <a:defRPr sz="1200" kern="1200">
+                <a:solidFill>
+                  <a:schemeClr val="tx2"/>
+                </a:solidFill>
+                <a:latin typeface="+mn-lt"/>
+                <a:ea typeface="+mn-ea"/>
+                <a:cs typeface="+mn-cs"/>
+              </a:defRPr>
+            </a:lvl5pPr>
+            <a:lvl6pPr marL="1900000" indent="-228600" algn="l" defTabSz="457200" rtl="0" eaLnBrk="1" latinLnBrk="0" hangingPunct="1">
+              <a:spcBef>
+                <a:spcPct val="20000"/>
+              </a:spcBef>
+              <a:spcAft>
+                <a:spcPts val="600"/>
+              </a:spcAft>
+              <a:buClr>
+                <a:schemeClr val="accent2"/>
+              </a:buClr>
+              <a:buSzPct val="92000"/>
+              <a:buFont typeface="Wingdings 2" panose="05020102010507070707" pitchFamily="18" charset="2"/>
+              <a:buChar char=""/>
+              <a:defRPr sz="1200" kern="1200">
+                <a:solidFill>
+                  <a:schemeClr val="tx2"/>
+                </a:solidFill>
+                <a:latin typeface="+mn-lt"/>
+                <a:ea typeface="+mn-ea"/>
+                <a:cs typeface="+mn-cs"/>
+              </a:defRPr>
+            </a:lvl6pPr>
+            <a:lvl7pPr marL="2200000" indent="-228600" algn="l" defTabSz="457200" rtl="0" eaLnBrk="1" latinLnBrk="0" hangingPunct="1">
+              <a:spcBef>
+                <a:spcPct val="20000"/>
+              </a:spcBef>
+              <a:spcAft>
+                <a:spcPts val="600"/>
+              </a:spcAft>
+              <a:buClr>
+                <a:schemeClr val="accent2"/>
+              </a:buClr>
+              <a:buSzPct val="92000"/>
+              <a:buFont typeface="Wingdings 2" panose="05020102010507070707" pitchFamily="18" charset="2"/>
+              <a:buChar char=""/>
+              <a:defRPr sz="1200" kern="1200">
+                <a:solidFill>
+                  <a:schemeClr val="tx2"/>
+                </a:solidFill>
+                <a:latin typeface="+mn-lt"/>
+                <a:ea typeface="+mn-ea"/>
+                <a:cs typeface="+mn-cs"/>
+              </a:defRPr>
+            </a:lvl7pPr>
+            <a:lvl8pPr marL="2500000" indent="-228600" algn="l" defTabSz="457200" rtl="0" eaLnBrk="1" latinLnBrk="0" hangingPunct="1">
+              <a:spcBef>
+                <a:spcPct val="20000"/>
+              </a:spcBef>
+              <a:spcAft>
+                <a:spcPts val="600"/>
+              </a:spcAft>
+              <a:buClr>
+                <a:schemeClr val="accent2"/>
+              </a:buClr>
+              <a:buSzPct val="92000"/>
+              <a:buFont typeface="Wingdings 2" panose="05020102010507070707" pitchFamily="18" charset="2"/>
+              <a:buChar char=""/>
+              <a:defRPr sz="1200" kern="1200">
+                <a:solidFill>
+                  <a:schemeClr val="tx2"/>
+                </a:solidFill>
+                <a:latin typeface="+mn-lt"/>
+                <a:ea typeface="+mn-ea"/>
+                <a:cs typeface="+mn-cs"/>
+              </a:defRPr>
+            </a:lvl8pPr>
+            <a:lvl9pPr marL="2800000" indent="-228600" algn="l" defTabSz="457200" rtl="0" eaLnBrk="1" latinLnBrk="0" hangingPunct="1">
+              <a:spcBef>
+                <a:spcPct val="20000"/>
+              </a:spcBef>
+              <a:spcAft>
+                <a:spcPts val="600"/>
+              </a:spcAft>
+              <a:buClr>
+                <a:schemeClr val="accent2"/>
+              </a:buClr>
+              <a:buSzPct val="92000"/>
+              <a:buFont typeface="Wingdings 2" panose="05020102010507070707" pitchFamily="18" charset="2"/>
+              <a:buChar char=""/>
+              <a:defRPr sz="1200" kern="1200">
+                <a:solidFill>
+                  <a:schemeClr val="tx2"/>
+                </a:solidFill>
+                <a:latin typeface="+mn-lt"/>
+                <a:ea typeface="+mn-ea"/>
+                <a:cs typeface="+mn-cs"/>
+              </a:defRPr>
+            </a:lvl9pPr>
+          </a:lstStyle>
+          <a:p>
+            <a:r>
+              <a:rPr lang="en-US" b="1" dirty="0">
+                <a:solidFill>
+                  <a:schemeClr val="accent6">
+                    <a:lumMod val="75000"/>
                   </a:schemeClr>
                 </a:solidFill>
               </a:rPr>
-              <a:t>What did you learn?</a:t>
-            </a:r>
-          </a:p>
-          <a:p>
+              <a:t>What we learned:</a:t>
+            </a:r>
+          </a:p>
+          <a:p>
+            <a:pPr lvl="1"/>
             <a:r>
               <a:rPr lang="en-US" dirty="0">
                 <a:solidFill>
-                  <a:schemeClr val="accent5">
-                    <a:lumMod val="20000"/>
-                    <a:lumOff val="80000"/>
+                  <a:schemeClr val="accent6">
+                    <a:lumMod val="75000"/>
                   </a:schemeClr>
                 </a:solidFill>
               </a:rPr>
-              <a:t>Go’s </a:t>
+              <a:t>Go’s database/</a:t>
             </a:r>
             <a:r>
               <a:rPr lang="en-US" dirty="0" err="1">
                 <a:solidFill>
-                  <a:schemeClr val="accent5">
-                    <a:lumMod val="20000"/>
-                    <a:lumOff val="80000"/>
+                  <a:schemeClr val="accent6">
+                    <a:lumMod val="75000"/>
                   </a:schemeClr>
                 </a:solidFill>
               </a:rPr>
@@ -5364,98 +7762,94 @@
             <a:r>
               <a:rPr lang="en-US" dirty="0">
                 <a:solidFill>
-                  <a:schemeClr val="accent5">
-                    <a:lumMod val="20000"/>
-                    <a:lumOff val="80000"/>
+                  <a:schemeClr val="accent6">
+                    <a:lumMod val="75000"/>
                   </a:schemeClr>
                 </a:solidFill>
               </a:rPr>
-              <a:t> library implements data cleansing easily via the use of the ? “operator” for parameter passing</a:t>
-            </a:r>
-          </a:p>
-          <a:p>
+              <a:t> library implements data cleansing easily via parameter passing</a:t>
+            </a:r>
+          </a:p>
+          <a:p>
+            <a:pPr lvl="1"/>
             <a:r>
               <a:rPr lang="en-US" dirty="0">
                 <a:solidFill>
-                  <a:schemeClr val="accent5">
-                    <a:lumMod val="20000"/>
-                    <a:lumOff val="80000"/>
+                  <a:schemeClr val="accent6">
+                    <a:lumMod val="75000"/>
                   </a:schemeClr>
                 </a:solidFill>
               </a:rPr>
-              <a:t>Data cleansing is an “easy” thing to guard against and not doing so just leads to unnecessary, careless site vulnerabilities.</a:t>
-            </a:r>
-          </a:p>
-          <a:p>
-            <a:r>
-              <a:rPr lang="en-US" strike="sngStrike" dirty="0">
-                <a:solidFill>
-                  <a:schemeClr val="accent5">
-                    <a:lumMod val="20000"/>
-                    <a:lumOff val="80000"/>
+              <a:t>Data cleansing is an “easy” thing to guard against</a:t>
+            </a:r>
+          </a:p>
+          <a:p>
+            <a:r>
+              <a:rPr lang="en-US" b="1" dirty="0">
+                <a:solidFill>
+                  <a:schemeClr val="accent6">
+                    <a:lumMod val="75000"/>
                   </a:schemeClr>
                 </a:solidFill>
               </a:rPr>
-              <a:t>What advice do you have for others?</a:t>
-            </a:r>
-          </a:p>
-          <a:p>
+              <a:t>Our advice:</a:t>
+            </a:r>
+          </a:p>
+          <a:p>
+            <a:pPr lvl="1"/>
             <a:r>
               <a:rPr lang="en-US" dirty="0">
                 <a:solidFill>
-                  <a:schemeClr val="accent5">
-                    <a:lumMod val="20000"/>
-                    <a:lumOff val="80000"/>
+                  <a:schemeClr val="accent6">
+                    <a:lumMod val="75000"/>
                   </a:schemeClr>
                 </a:solidFill>
               </a:rPr>
-              <a:t>In whatever language you’re coding in, if you are accepting data from the user, check to see if there is built-in functionality for data cleansing that you can easily implement.</a:t>
-            </a:r>
-          </a:p>
-          <a:p>
-            <a:r>
-              <a:rPr lang="en-US" strike="sngStrike" dirty="0">
-                <a:solidFill>
-                  <a:schemeClr val="accent5">
-                    <a:lumMod val="20000"/>
-                    <a:lumOff val="80000"/>
+              <a:t>In whatever language you’re coding in, if you are accepting data from the user, check to see if there is built-in functionality for data cleansing that you can easily implement</a:t>
+            </a:r>
+          </a:p>
+          <a:p>
+            <a:r>
+              <a:rPr lang="en-US" b="1" dirty="0">
+                <a:solidFill>
+                  <a:schemeClr val="accent6">
+                    <a:lumMod val="75000"/>
                   </a:schemeClr>
                 </a:solidFill>
               </a:rPr>
-              <a:t>What will you do differently (or take forward) in the workplace?</a:t>
-            </a:r>
-          </a:p>
-          <a:p>
+              <a:t>Applications to the workplace:</a:t>
+            </a:r>
+          </a:p>
+          <a:p>
+            <a:pPr lvl="1"/>
             <a:r>
               <a:rPr lang="en-US" dirty="0">
                 <a:solidFill>
-                  <a:schemeClr val="accent5">
-                    <a:lumMod val="20000"/>
-                    <a:lumOff val="80000"/>
+                  <a:schemeClr val="accent6">
+                    <a:lumMod val="75000"/>
                   </a:schemeClr>
                 </a:solidFill>
               </a:rPr>
-              <a:t>A higher conscientiousness of how easy it can be for an adversary to exploit a vulnerability in a website whenever they have the opportunity to enter information.</a:t>
-            </a:r>
-          </a:p>
-          <a:p>
+              <a:t>A higher conscientiousness of how easy it can be for an adversary to exploit a vulnerability in a website whenever they have the opportunity to enter information</a:t>
+            </a:r>
+          </a:p>
+          <a:p>
+            <a:pPr lvl="1"/>
             <a:r>
               <a:rPr lang="en-US" dirty="0">
                 <a:solidFill>
-                  <a:schemeClr val="accent5">
-                    <a:lumMod val="20000"/>
-                    <a:lumOff val="80000"/>
+                  <a:schemeClr val="accent6">
+                    <a:lumMod val="75000"/>
                   </a:schemeClr>
                 </a:solidFill>
               </a:rPr>
-              <a:t> The knowledge that safe parameter passing is built-in in many languages/</a:t>
+              <a:t>The knowledge that safe parameter passing is built-in in many languages/</a:t>
             </a:r>
             <a:r>
               <a:rPr lang="en-US" dirty="0" err="1">
                 <a:solidFill>
-                  <a:schemeClr val="accent5">
-                    <a:lumMod val="20000"/>
-                    <a:lumOff val="80000"/>
+                  <a:schemeClr val="accent6">
+                    <a:lumMod val="75000"/>
                   </a:schemeClr>
                 </a:solidFill>
               </a:rPr>
@@ -5464,14 +7858,151 @@
             <a:r>
               <a:rPr lang="en-US" dirty="0">
                 <a:solidFill>
-                  <a:schemeClr val="accent5">
-                    <a:lumMod val="20000"/>
-                    <a:lumOff val="80000"/>
+                  <a:schemeClr val="accent6">
+                    <a:lumMod val="75000"/>
                   </a:schemeClr>
                 </a:solidFill>
               </a:rPr>
-              <a:t> libraries and that this functionality should be used</a:t>
-            </a:r>
+              <a:t> libraries</a:t>
+            </a:r>
+          </a:p>
+        </p:txBody>
+      </p:sp>
+      <p:pic>
+        <p:nvPicPr>
+          <p:cNvPr id="16" name="Picture 15">
+            <a:extLst>
+              <a:ext uri="{FF2B5EF4-FFF2-40B4-BE49-F238E27FC236}">
+                <a16:creationId xmlns:a16="http://schemas.microsoft.com/office/drawing/2014/main" id="{57F57B2A-FB2D-2C2B-E5C5-D2040273D357}"/>
+              </a:ext>
+            </a:extLst>
+          </p:cNvPr>
+          <p:cNvPicPr>
+            <a:picLocks noChangeAspect="1"/>
+          </p:cNvPicPr>
+          <p:nvPr/>
+        </p:nvPicPr>
+        <p:blipFill>
+          <a:blip r:embed="rId3"/>
+          <a:stretch>
+            <a:fillRect/>
+          </a:stretch>
+        </p:blipFill>
+        <p:spPr>
+          <a:xfrm>
+            <a:off x="6182359" y="1958843"/>
+            <a:ext cx="5772767" cy="832611"/>
+          </a:xfrm>
+          <a:prstGeom prst="rect">
+            <a:avLst/>
+          </a:prstGeom>
+          <a:ln>
+            <a:noFill/>
+          </a:ln>
+          <a:effectLst>
+            <a:outerShdw blurRad="292100" dist="139700" dir="2700000" algn="tl" rotWithShape="0">
+              <a:srgbClr val="333333">
+                <a:alpha val="65000"/>
+              </a:srgbClr>
+            </a:outerShdw>
+          </a:effectLst>
+        </p:spPr>
+      </p:pic>
+      <p:pic>
+        <p:nvPicPr>
+          <p:cNvPr id="18" name="Picture 17">
+            <a:extLst>
+              <a:ext uri="{FF2B5EF4-FFF2-40B4-BE49-F238E27FC236}">
+                <a16:creationId xmlns:a16="http://schemas.microsoft.com/office/drawing/2014/main" id="{64522ECD-71D9-06F4-CD76-DE66F82EA6A2}"/>
+              </a:ext>
+            </a:extLst>
+          </p:cNvPr>
+          <p:cNvPicPr>
+            <a:picLocks noChangeAspect="1"/>
+          </p:cNvPicPr>
+          <p:nvPr/>
+        </p:nvPicPr>
+        <p:blipFill>
+          <a:blip r:embed="rId4"/>
+          <a:stretch>
+            <a:fillRect/>
+          </a:stretch>
+        </p:blipFill>
+        <p:spPr>
+          <a:xfrm>
+            <a:off x="6182359" y="3741732"/>
+            <a:ext cx="5772768" cy="2304935"/>
+          </a:xfrm>
+          <a:prstGeom prst="rect">
+            <a:avLst/>
+          </a:prstGeom>
+          <a:ln>
+            <a:noFill/>
+          </a:ln>
+          <a:effectLst>
+            <a:outerShdw blurRad="292100" dist="139700" dir="2700000" algn="tl" rotWithShape="0">
+              <a:srgbClr val="333333">
+                <a:alpha val="65000"/>
+              </a:srgbClr>
+            </a:outerShdw>
+          </a:effectLst>
+        </p:spPr>
+      </p:pic>
+      <p:sp>
+        <p:nvSpPr>
+          <p:cNvPr id="20" name="Rectangle 19">
+            <a:extLst>
+              <a:ext uri="{FF2B5EF4-FFF2-40B4-BE49-F238E27FC236}">
+                <a16:creationId xmlns:a16="http://schemas.microsoft.com/office/drawing/2014/main" id="{3C946106-97AD-8835-6BA4-BD61A055B3ED}"/>
+              </a:ext>
+            </a:extLst>
+          </p:cNvPr>
+          <p:cNvSpPr/>
+          <p:nvPr/>
+        </p:nvSpPr>
+        <p:spPr>
+          <a:xfrm>
+            <a:off x="447040" y="457200"/>
+            <a:ext cx="3718560" cy="91440"/>
+          </a:xfrm>
+          <a:prstGeom prst="rect">
+            <a:avLst/>
+          </a:prstGeom>
+          <a:solidFill>
+            <a:srgbClr val="3D3C3C"/>
+          </a:solidFill>
+          <a:ln>
+            <a:solidFill>
+              <a:srgbClr val="3D3C3C"/>
+            </a:solidFill>
+          </a:ln>
+        </p:spPr>
+        <p:style>
+          <a:lnRef idx="2">
+            <a:schemeClr val="accent1">
+              <a:shade val="50000"/>
+            </a:schemeClr>
+          </a:lnRef>
+          <a:fillRef idx="1">
+            <a:schemeClr val="accent1"/>
+          </a:fillRef>
+          <a:effectRef idx="0">
+            <a:schemeClr val="accent1"/>
+          </a:effectRef>
+          <a:fontRef idx="minor">
+            <a:schemeClr val="lt1"/>
+          </a:fontRef>
+        </p:style>
+        <p:txBody>
+          <a:bodyPr rtlCol="0" anchor="ctr"/>
+          <a:lstStyle/>
+          <a:p>
+            <a:pPr algn="ctr"/>
+            <a:endParaRPr lang="en-US">
+              <a:solidFill>
+                <a:srgbClr val="3D3C3C"/>
+              </a:solidFill>
+            </a:endParaRPr>
           </a:p>
         </p:txBody>
       </p:sp>

</xml_diff>

<commit_message>
Final presentation with demo slide
</commit_message>
<xml_diff>
--- a/Project Presentation.pptx
+++ b/Project Presentation.pptx
@@ -5,7 +5,7 @@
     <p:sldMasterId id="2147483660" r:id="rId1"/>
   </p:sldMasterIdLst>
   <p:notesMasterIdLst>
-    <p:notesMasterId r:id="rId7"/>
+    <p:notesMasterId r:id="rId8"/>
   </p:notesMasterIdLst>
   <p:sldIdLst>
     <p:sldId id="256" r:id="rId2"/>
@@ -13,6 +13,7 @@
     <p:sldId id="258" r:id="rId4"/>
     <p:sldId id="261" r:id="rId5"/>
     <p:sldId id="260" r:id="rId6"/>
+    <p:sldId id="262" r:id="rId7"/>
   </p:sldIdLst>
   <p:sldSz cx="12192000" cy="6858000"/>
   <p:notesSz cx="6858000" cy="9144000"/>
@@ -201,7 +202,7 @@
           <a:p>
             <a:fld id="{A4D92528-8F91-4702-9CE2-747064616D0F}" type="datetimeFigureOut">
               <a:rPr lang="en-US" smtClean="0"/>
-              <a:t>11/29/2022</a:t>
+              <a:t>12/1/2022</a:t>
             </a:fld>
             <a:endParaRPr lang="en-US"/>
           </a:p>
@@ -903,6 +904,90 @@
 </p:notes>
 </file>
 
+<file path=ppt/notesSlides/notesSlide6.xml><?xml version="1.0" encoding="utf-8"?>
+<p:notes xmlns:a="http://schemas.openxmlformats.org/drawingml/2006/main" xmlns:r="http://schemas.openxmlformats.org/officeDocument/2006/relationships" xmlns:p="http://schemas.openxmlformats.org/presentationml/2006/main">
+  <p:cSld>
+    <p:spTree>
+      <p:nvGrpSpPr>
+        <p:cNvPr id="1" name=""/>
+        <p:cNvGrpSpPr/>
+        <p:nvPr/>
+      </p:nvGrpSpPr>
+      <p:grpSpPr>
+        <a:xfrm>
+          <a:off x="0" y="0"/>
+          <a:ext cx="0" cy="0"/>
+          <a:chOff x="0" y="0"/>
+          <a:chExt cx="0" cy="0"/>
+        </a:xfrm>
+      </p:grpSpPr>
+      <p:sp>
+        <p:nvSpPr>
+          <p:cNvPr id="2" name="Slide Image Placeholder 1"/>
+          <p:cNvSpPr>
+            <a:spLocks noGrp="1" noRot="1" noChangeAspect="1"/>
+          </p:cNvSpPr>
+          <p:nvPr>
+            <p:ph type="sldImg"/>
+          </p:nvPr>
+        </p:nvSpPr>
+        <p:spPr/>
+      </p:sp>
+      <p:sp>
+        <p:nvSpPr>
+          <p:cNvPr id="3" name="Notes Placeholder 2"/>
+          <p:cNvSpPr>
+            <a:spLocks noGrp="1"/>
+          </p:cNvSpPr>
+          <p:nvPr>
+            <p:ph type="body" idx="1"/>
+          </p:nvPr>
+        </p:nvSpPr>
+        <p:spPr/>
+        <p:txBody>
+          <a:bodyPr/>
+          <a:lstStyle/>
+          <a:p>
+            <a:endParaRPr lang="en-US" dirty="0"/>
+          </a:p>
+        </p:txBody>
+      </p:sp>
+      <p:sp>
+        <p:nvSpPr>
+          <p:cNvPr id="4" name="Slide Number Placeholder 3"/>
+          <p:cNvSpPr>
+            <a:spLocks noGrp="1"/>
+          </p:cNvSpPr>
+          <p:nvPr>
+            <p:ph type="sldNum" sz="quarter" idx="5"/>
+          </p:nvPr>
+        </p:nvSpPr>
+        <p:spPr/>
+        <p:txBody>
+          <a:bodyPr/>
+          <a:lstStyle/>
+          <a:p>
+            <a:fld id="{C7025C90-C1C1-42B7-9D47-5D69212FD166}" type="slidenum">
+              <a:rPr lang="en-US" smtClean="0"/>
+              <a:t>6</a:t>
+            </a:fld>
+            <a:endParaRPr lang="en-US"/>
+          </a:p>
+        </p:txBody>
+      </p:sp>
+    </p:spTree>
+    <p:extLst>
+      <p:ext uri="{BB962C8B-B14F-4D97-AF65-F5344CB8AC3E}">
+        <p14:creationId xmlns:p14="http://schemas.microsoft.com/office/powerpoint/2010/main" val="3644793360"/>
+      </p:ext>
+    </p:extLst>
+  </p:cSld>
+  <p:clrMapOvr>
+    <a:masterClrMapping/>
+  </p:clrMapOvr>
+</p:notes>
+</file>
+
 <file path=ppt/slideLayouts/slideLayout1.xml><?xml version="1.0" encoding="utf-8"?>
 <p:sldLayout xmlns:a="http://schemas.openxmlformats.org/drawingml/2006/main" xmlns:r="http://schemas.openxmlformats.org/officeDocument/2006/relationships" xmlns:p="http://schemas.openxmlformats.org/presentationml/2006/main" type="title" preserve="1">
   <p:cSld name="Title Slide">
@@ -1149,7 +1234,7 @@
             <a:fld id="{B61BEF0D-F0BB-DE4B-95CE-6DB70DBA9567}" type="datetimeFigureOut">
               <a:rPr lang="en-US" smtClean="0"/>
               <a:pPr/>
-              <a:t>11/29/2022</a:t>
+              <a:t>12/1/2022</a:t>
             </a:fld>
             <a:endParaRPr lang="en-US" dirty="0"/>
           </a:p>
@@ -1413,7 +1498,7 @@
             <a:fld id="{B61BEF0D-F0BB-DE4B-95CE-6DB70DBA9567}" type="datetimeFigureOut">
               <a:rPr lang="en-US" smtClean="0"/>
               <a:pPr/>
-              <a:t>11/29/2022</a:t>
+              <a:t>12/1/2022</a:t>
             </a:fld>
             <a:endParaRPr lang="en-US" dirty="0"/>
           </a:p>
@@ -1650,7 +1735,7 @@
             <a:fld id="{B61BEF0D-F0BB-DE4B-95CE-6DB70DBA9567}" type="datetimeFigureOut">
               <a:rPr lang="en-US" smtClean="0"/>
               <a:pPr/>
-              <a:t>11/29/2022</a:t>
+              <a:t>12/1/2022</a:t>
             </a:fld>
             <a:endParaRPr lang="en-US" dirty="0"/>
           </a:p>
@@ -1892,7 +1977,7 @@
             <a:fld id="{B61BEF0D-F0BB-DE4B-95CE-6DB70DBA9567}" type="datetimeFigureOut">
               <a:rPr lang="en-US" smtClean="0"/>
               <a:pPr/>
-              <a:t>11/29/2022</a:t>
+              <a:t>12/1/2022</a:t>
             </a:fld>
             <a:endParaRPr lang="en-US" dirty="0"/>
           </a:p>
@@ -2201,7 +2286,7 @@
             <a:fld id="{B61BEF0D-F0BB-DE4B-95CE-6DB70DBA9567}" type="datetimeFigureOut">
               <a:rPr lang="en-US" smtClean="0"/>
               <a:pPr/>
-              <a:t>11/29/2022</a:t>
+              <a:t>12/1/2022</a:t>
             </a:fld>
             <a:endParaRPr lang="en-US" dirty="0"/>
           </a:p>
@@ -2505,7 +2590,7 @@
             <a:fld id="{B61BEF0D-F0BB-DE4B-95CE-6DB70DBA9567}" type="datetimeFigureOut">
               <a:rPr lang="en-US" smtClean="0"/>
               <a:pPr/>
-              <a:t>11/29/2022</a:t>
+              <a:t>12/1/2022</a:t>
             </a:fld>
             <a:endParaRPr lang="en-US" dirty="0"/>
           </a:p>
@@ -2929,7 +3014,7 @@
             <a:fld id="{B61BEF0D-F0BB-DE4B-95CE-6DB70DBA9567}" type="datetimeFigureOut">
               <a:rPr lang="en-US" smtClean="0"/>
               <a:pPr/>
-              <a:t>11/29/2022</a:t>
+              <a:t>12/1/2022</a:t>
             </a:fld>
             <a:endParaRPr lang="en-US" dirty="0"/>
           </a:p>
@@ -3093,7 +3178,7 @@
             <a:fld id="{B61BEF0D-F0BB-DE4B-95CE-6DB70DBA9567}" type="datetimeFigureOut">
               <a:rPr lang="en-US" smtClean="0"/>
               <a:pPr/>
-              <a:t>11/29/2022</a:t>
+              <a:t>12/1/2022</a:t>
             </a:fld>
             <a:endParaRPr lang="en-US" dirty="0"/>
           </a:p>
@@ -3190,7 +3275,7 @@
             <a:fld id="{B61BEF0D-F0BB-DE4B-95CE-6DB70DBA9567}" type="datetimeFigureOut">
               <a:rPr lang="en-US" smtClean="0"/>
               <a:pPr/>
-              <a:t>11/29/2022</a:t>
+              <a:t>12/1/2022</a:t>
             </a:fld>
             <a:endParaRPr lang="en-US" dirty="0"/>
           </a:p>
@@ -3570,7 +3655,7 @@
             <a:fld id="{B61BEF0D-F0BB-DE4B-95CE-6DB70DBA9567}" type="datetimeFigureOut">
               <a:rPr lang="en-US" smtClean="0"/>
               <a:pPr/>
-              <a:t>11/29/2022</a:t>
+              <a:t>12/1/2022</a:t>
             </a:fld>
             <a:endParaRPr lang="en-US" dirty="0"/>
           </a:p>
@@ -3861,7 +3946,7 @@
             <a:fld id="{B61BEF0D-F0BB-DE4B-95CE-6DB70DBA9567}" type="datetimeFigureOut">
               <a:rPr lang="en-US" smtClean="0"/>
               <a:pPr/>
-              <a:t>11/29/2022</a:t>
+              <a:t>12/1/2022</a:t>
             </a:fld>
             <a:endParaRPr lang="en-US" dirty="0"/>
           </a:p>
@@ -4077,7 +4162,7 @@
             <a:fld id="{B61BEF0D-F0BB-DE4B-95CE-6DB70DBA9567}" type="datetimeFigureOut">
               <a:rPr lang="en-US" smtClean="0"/>
               <a:pPr/>
-              <a:t>11/29/2022</a:t>
+              <a:t>12/1/2022</a:t>
             </a:fld>
             <a:endParaRPr lang="en-US" dirty="0"/>
           </a:p>
@@ -4951,7 +5036,7 @@
                 </a:solidFill>
                 <a:latin typeface="Abadi Extra Light" panose="020B0204020104020204" pitchFamily="34" charset="0"/>
               </a:rPr>
-              <a:t>RED(Head) Team</a:t>
+              <a:t>Ginger Team</a:t>
             </a:r>
             <a:br>
               <a:rPr lang="en-US" b="1" dirty="0">
@@ -7491,10 +7576,9 @@
           </a:lstStyle>
           <a:p>
             <a:r>
-              <a:rPr lang="en-US" sz="4000" b="1"/>
+              <a:rPr lang="en-US" sz="4000" b="1" dirty="0"/>
               <a:t>Lessons Learned</a:t>
             </a:r>
-            <a:endParaRPr lang="en-US" sz="4000" b="1" dirty="0"/>
           </a:p>
         </p:txBody>
       </p:sp>
@@ -8010,6 +8094,683 @@
     <p:extLst>
       <p:ext uri="{BB962C8B-B14F-4D97-AF65-F5344CB8AC3E}">
         <p14:creationId xmlns:p14="http://schemas.microsoft.com/office/powerpoint/2010/main" val="550552520"/>
+      </p:ext>
+    </p:extLst>
+  </p:cSld>
+  <p:clrMapOvr>
+    <a:masterClrMapping/>
+  </p:clrMapOvr>
+</p:sld>
+</file>
+
+<file path=ppt/slides/slide6.xml><?xml version="1.0" encoding="utf-8"?>
+<p:sld xmlns:a="http://schemas.openxmlformats.org/drawingml/2006/main" xmlns:r="http://schemas.openxmlformats.org/officeDocument/2006/relationships" xmlns:p="http://schemas.openxmlformats.org/presentationml/2006/main">
+  <p:cSld>
+    <p:spTree>
+      <p:nvGrpSpPr>
+        <p:cNvPr id="1" name=""/>
+        <p:cNvGrpSpPr/>
+        <p:nvPr/>
+      </p:nvGrpSpPr>
+      <p:grpSpPr>
+        <a:xfrm>
+          <a:off x="0" y="0"/>
+          <a:ext cx="0" cy="0"/>
+          <a:chOff x="0" y="0"/>
+          <a:chExt cx="0" cy="0"/>
+        </a:xfrm>
+      </p:grpSpPr>
+      <p:sp>
+        <p:nvSpPr>
+          <p:cNvPr id="2" name="Content Placeholder 2">
+            <a:extLst>
+              <a:ext uri="{FF2B5EF4-FFF2-40B4-BE49-F238E27FC236}">
+                <a16:creationId xmlns:a16="http://schemas.microsoft.com/office/drawing/2014/main" id="{8531F666-E1E8-ABCD-2E8C-83F59EFF3632}"/>
+              </a:ext>
+            </a:extLst>
+          </p:cNvPr>
+          <p:cNvSpPr txBox="1">
+            <a:spLocks/>
+          </p:cNvSpPr>
+          <p:nvPr/>
+        </p:nvSpPr>
+        <p:spPr>
+          <a:xfrm>
+            <a:off x="498358" y="558800"/>
+            <a:ext cx="4454642" cy="5112795"/>
+          </a:xfrm>
+          <a:prstGeom prst="rect">
+            <a:avLst/>
+          </a:prstGeom>
+        </p:spPr>
+        <p:txBody>
+          <a:bodyPr anchor="ctr">
+            <a:normAutofit/>
+          </a:bodyPr>
+          <a:lstStyle>
+            <a:lvl1pPr marL="306000" indent="-306000" algn="l" defTabSz="457200" rtl="0" eaLnBrk="1" latinLnBrk="0" hangingPunct="1">
+              <a:spcBef>
+                <a:spcPct val="20000"/>
+              </a:spcBef>
+              <a:spcAft>
+                <a:spcPts val="600"/>
+              </a:spcAft>
+              <a:buClr>
+                <a:schemeClr val="accent2"/>
+              </a:buClr>
+              <a:buSzPct val="92000"/>
+              <a:buFont typeface="Wingdings 2" panose="05020102010507070707" pitchFamily="18" charset="2"/>
+              <a:buChar char=""/>
+              <a:defRPr sz="1800" kern="1200">
+                <a:solidFill>
+                  <a:schemeClr val="tx2"/>
+                </a:solidFill>
+                <a:latin typeface="+mn-lt"/>
+                <a:ea typeface="+mn-ea"/>
+                <a:cs typeface="+mn-cs"/>
+              </a:defRPr>
+            </a:lvl1pPr>
+            <a:lvl2pPr marL="630000" indent="-306000" algn="l" defTabSz="457200" rtl="0" eaLnBrk="1" latinLnBrk="0" hangingPunct="1">
+              <a:spcBef>
+                <a:spcPct val="20000"/>
+              </a:spcBef>
+              <a:spcAft>
+                <a:spcPts val="600"/>
+              </a:spcAft>
+              <a:buClr>
+                <a:schemeClr val="accent2"/>
+              </a:buClr>
+              <a:buSzPct val="92000"/>
+              <a:buFont typeface="Wingdings 2" panose="05020102010507070707" pitchFamily="18" charset="2"/>
+              <a:buChar char=""/>
+              <a:defRPr sz="1600" kern="1200">
+                <a:solidFill>
+                  <a:schemeClr val="tx2"/>
+                </a:solidFill>
+                <a:latin typeface="+mn-lt"/>
+                <a:ea typeface="+mn-ea"/>
+                <a:cs typeface="+mn-cs"/>
+              </a:defRPr>
+            </a:lvl2pPr>
+            <a:lvl3pPr marL="900000" indent="-270000" algn="l" defTabSz="457200" rtl="0" eaLnBrk="1" latinLnBrk="0" hangingPunct="1">
+              <a:spcBef>
+                <a:spcPct val="20000"/>
+              </a:spcBef>
+              <a:spcAft>
+                <a:spcPts val="600"/>
+              </a:spcAft>
+              <a:buClr>
+                <a:schemeClr val="accent2"/>
+              </a:buClr>
+              <a:buSzPct val="92000"/>
+              <a:buFont typeface="Wingdings 2" panose="05020102010507070707" pitchFamily="18" charset="2"/>
+              <a:buChar char=""/>
+              <a:defRPr sz="1400" kern="1200">
+                <a:solidFill>
+                  <a:schemeClr val="tx2"/>
+                </a:solidFill>
+                <a:latin typeface="+mn-lt"/>
+                <a:ea typeface="+mn-ea"/>
+                <a:cs typeface="+mn-cs"/>
+              </a:defRPr>
+            </a:lvl3pPr>
+            <a:lvl4pPr marL="1242000" indent="-234000" algn="l" defTabSz="457200" rtl="0" eaLnBrk="1" latinLnBrk="0" hangingPunct="1">
+              <a:spcBef>
+                <a:spcPct val="20000"/>
+              </a:spcBef>
+              <a:spcAft>
+                <a:spcPts val="600"/>
+              </a:spcAft>
+              <a:buClr>
+                <a:schemeClr val="accent2"/>
+              </a:buClr>
+              <a:buSzPct val="92000"/>
+              <a:buFont typeface="Wingdings 2" panose="05020102010507070707" pitchFamily="18" charset="2"/>
+              <a:buChar char=""/>
+              <a:defRPr sz="1200" kern="1200">
+                <a:solidFill>
+                  <a:schemeClr val="tx2"/>
+                </a:solidFill>
+                <a:latin typeface="+mn-lt"/>
+                <a:ea typeface="+mn-ea"/>
+                <a:cs typeface="+mn-cs"/>
+              </a:defRPr>
+            </a:lvl4pPr>
+            <a:lvl5pPr marL="1602000" indent="-234000" algn="l" defTabSz="457200" rtl="0" eaLnBrk="1" latinLnBrk="0" hangingPunct="1">
+              <a:spcBef>
+                <a:spcPct val="20000"/>
+              </a:spcBef>
+              <a:spcAft>
+                <a:spcPts val="600"/>
+              </a:spcAft>
+              <a:buClr>
+                <a:schemeClr val="accent2"/>
+              </a:buClr>
+              <a:buSzPct val="92000"/>
+              <a:buFont typeface="Wingdings 2" panose="05020102010507070707" pitchFamily="18" charset="2"/>
+              <a:buChar char=""/>
+              <a:defRPr sz="1200" kern="1200">
+                <a:solidFill>
+                  <a:schemeClr val="tx2"/>
+                </a:solidFill>
+                <a:latin typeface="+mn-lt"/>
+                <a:ea typeface="+mn-ea"/>
+                <a:cs typeface="+mn-cs"/>
+              </a:defRPr>
+            </a:lvl5pPr>
+            <a:lvl6pPr marL="1900000" indent="-228600" algn="l" defTabSz="457200" rtl="0" eaLnBrk="1" latinLnBrk="0" hangingPunct="1">
+              <a:spcBef>
+                <a:spcPct val="20000"/>
+              </a:spcBef>
+              <a:spcAft>
+                <a:spcPts val="600"/>
+              </a:spcAft>
+              <a:buClr>
+                <a:schemeClr val="accent2"/>
+              </a:buClr>
+              <a:buSzPct val="92000"/>
+              <a:buFont typeface="Wingdings 2" panose="05020102010507070707" pitchFamily="18" charset="2"/>
+              <a:buChar char=""/>
+              <a:defRPr sz="1200" kern="1200">
+                <a:solidFill>
+                  <a:schemeClr val="tx2"/>
+                </a:solidFill>
+                <a:latin typeface="+mn-lt"/>
+                <a:ea typeface="+mn-ea"/>
+                <a:cs typeface="+mn-cs"/>
+              </a:defRPr>
+            </a:lvl6pPr>
+            <a:lvl7pPr marL="2200000" indent="-228600" algn="l" defTabSz="457200" rtl="0" eaLnBrk="1" latinLnBrk="0" hangingPunct="1">
+              <a:spcBef>
+                <a:spcPct val="20000"/>
+              </a:spcBef>
+              <a:spcAft>
+                <a:spcPts val="600"/>
+              </a:spcAft>
+              <a:buClr>
+                <a:schemeClr val="accent2"/>
+              </a:buClr>
+              <a:buSzPct val="92000"/>
+              <a:buFont typeface="Wingdings 2" panose="05020102010507070707" pitchFamily="18" charset="2"/>
+              <a:buChar char=""/>
+              <a:defRPr sz="1200" kern="1200">
+                <a:solidFill>
+                  <a:schemeClr val="tx2"/>
+                </a:solidFill>
+                <a:latin typeface="+mn-lt"/>
+                <a:ea typeface="+mn-ea"/>
+                <a:cs typeface="+mn-cs"/>
+              </a:defRPr>
+            </a:lvl7pPr>
+            <a:lvl8pPr marL="2500000" indent="-228600" algn="l" defTabSz="457200" rtl="0" eaLnBrk="1" latinLnBrk="0" hangingPunct="1">
+              <a:spcBef>
+                <a:spcPct val="20000"/>
+              </a:spcBef>
+              <a:spcAft>
+                <a:spcPts val="600"/>
+              </a:spcAft>
+              <a:buClr>
+                <a:schemeClr val="accent2"/>
+              </a:buClr>
+              <a:buSzPct val="92000"/>
+              <a:buFont typeface="Wingdings 2" panose="05020102010507070707" pitchFamily="18" charset="2"/>
+              <a:buChar char=""/>
+              <a:defRPr sz="1200" kern="1200">
+                <a:solidFill>
+                  <a:schemeClr val="tx2"/>
+                </a:solidFill>
+                <a:latin typeface="+mn-lt"/>
+                <a:ea typeface="+mn-ea"/>
+                <a:cs typeface="+mn-cs"/>
+              </a:defRPr>
+            </a:lvl8pPr>
+            <a:lvl9pPr marL="2800000" indent="-228600" algn="l" defTabSz="457200" rtl="0" eaLnBrk="1" latinLnBrk="0" hangingPunct="1">
+              <a:spcBef>
+                <a:spcPct val="20000"/>
+              </a:spcBef>
+              <a:spcAft>
+                <a:spcPts val="600"/>
+              </a:spcAft>
+              <a:buClr>
+                <a:schemeClr val="accent2"/>
+              </a:buClr>
+              <a:buSzPct val="92000"/>
+              <a:buFont typeface="Wingdings 2" panose="05020102010507070707" pitchFamily="18" charset="2"/>
+              <a:buChar char=""/>
+              <a:defRPr sz="1200" kern="1200">
+                <a:solidFill>
+                  <a:schemeClr val="tx2"/>
+                </a:solidFill>
+                <a:latin typeface="+mn-lt"/>
+                <a:ea typeface="+mn-ea"/>
+                <a:cs typeface="+mn-cs"/>
+              </a:defRPr>
+            </a:lvl9pPr>
+          </a:lstStyle>
+          <a:p>
+            <a:pPr lvl="1"/>
+            <a:r>
+              <a:rPr lang="en-US" sz="4400" dirty="0">
+                <a:solidFill>
+                  <a:schemeClr val="accent5">
+                    <a:lumMod val="20000"/>
+                    <a:lumOff val="80000"/>
+                  </a:schemeClr>
+                </a:solidFill>
+                <a:hlinkClick r:id="rId3"/>
+              </a:rPr>
+              <a:t>Vulnerable site</a:t>
+            </a:r>
+            <a:endParaRPr lang="en-US" sz="4400" dirty="0">
+              <a:solidFill>
+                <a:schemeClr val="accent5">
+                  <a:lumMod val="20000"/>
+                  <a:lumOff val="80000"/>
+                </a:schemeClr>
+              </a:solidFill>
+            </a:endParaRPr>
+          </a:p>
+          <a:p>
+            <a:pPr lvl="1"/>
+            <a:r>
+              <a:rPr lang="en-US" sz="4400" dirty="0">
+                <a:solidFill>
+                  <a:schemeClr val="accent5">
+                    <a:lumMod val="20000"/>
+                    <a:lumOff val="80000"/>
+                  </a:schemeClr>
+                </a:solidFill>
+                <a:hlinkClick r:id="rId4"/>
+              </a:rPr>
+              <a:t>Secure Site</a:t>
+            </a:r>
+            <a:endParaRPr lang="en-US" sz="4400" dirty="0">
+              <a:solidFill>
+                <a:schemeClr val="accent5">
+                  <a:lumMod val="20000"/>
+                  <a:lumOff val="80000"/>
+                </a:schemeClr>
+              </a:solidFill>
+            </a:endParaRPr>
+          </a:p>
+        </p:txBody>
+      </p:sp>
+      <p:sp>
+        <p:nvSpPr>
+          <p:cNvPr id="3" name="Content Placeholder 2">
+            <a:extLst>
+              <a:ext uri="{FF2B5EF4-FFF2-40B4-BE49-F238E27FC236}">
+                <a16:creationId xmlns:a16="http://schemas.microsoft.com/office/drawing/2014/main" id="{74D124C6-1DE4-0E05-3DBF-0931C82C76FB}"/>
+              </a:ext>
+            </a:extLst>
+          </p:cNvPr>
+          <p:cNvSpPr txBox="1">
+            <a:spLocks/>
+          </p:cNvSpPr>
+          <p:nvPr/>
+        </p:nvSpPr>
+        <p:spPr>
+          <a:xfrm>
+            <a:off x="498358" y="614680"/>
+            <a:ext cx="4012164" cy="1442720"/>
+          </a:xfrm>
+          <a:prstGeom prst="rect">
+            <a:avLst/>
+          </a:prstGeom>
+        </p:spPr>
+        <p:txBody>
+          <a:bodyPr anchor="ctr">
+            <a:normAutofit/>
+          </a:bodyPr>
+          <a:lstStyle>
+            <a:lvl1pPr marL="306000" indent="-306000" algn="l" defTabSz="457200" rtl="0" eaLnBrk="1" latinLnBrk="0" hangingPunct="1">
+              <a:spcBef>
+                <a:spcPct val="20000"/>
+              </a:spcBef>
+              <a:spcAft>
+                <a:spcPts val="600"/>
+              </a:spcAft>
+              <a:buClr>
+                <a:schemeClr val="accent2"/>
+              </a:buClr>
+              <a:buSzPct val="92000"/>
+              <a:buFont typeface="Wingdings 2" panose="05020102010507070707" pitchFamily="18" charset="2"/>
+              <a:buChar char=""/>
+              <a:defRPr sz="1800" kern="1200">
+                <a:solidFill>
+                  <a:schemeClr val="tx2"/>
+                </a:solidFill>
+                <a:latin typeface="+mn-lt"/>
+                <a:ea typeface="+mn-ea"/>
+                <a:cs typeface="+mn-cs"/>
+              </a:defRPr>
+            </a:lvl1pPr>
+            <a:lvl2pPr marL="630000" indent="-306000" algn="l" defTabSz="457200" rtl="0" eaLnBrk="1" latinLnBrk="0" hangingPunct="1">
+              <a:spcBef>
+                <a:spcPct val="20000"/>
+              </a:spcBef>
+              <a:spcAft>
+                <a:spcPts val="600"/>
+              </a:spcAft>
+              <a:buClr>
+                <a:schemeClr val="accent2"/>
+              </a:buClr>
+              <a:buSzPct val="92000"/>
+              <a:buFont typeface="Wingdings 2" panose="05020102010507070707" pitchFamily="18" charset="2"/>
+              <a:buChar char=""/>
+              <a:defRPr sz="1600" kern="1200">
+                <a:solidFill>
+                  <a:schemeClr val="tx2"/>
+                </a:solidFill>
+                <a:latin typeface="+mn-lt"/>
+                <a:ea typeface="+mn-ea"/>
+                <a:cs typeface="+mn-cs"/>
+              </a:defRPr>
+            </a:lvl2pPr>
+            <a:lvl3pPr marL="900000" indent="-270000" algn="l" defTabSz="457200" rtl="0" eaLnBrk="1" latinLnBrk="0" hangingPunct="1">
+              <a:spcBef>
+                <a:spcPct val="20000"/>
+              </a:spcBef>
+              <a:spcAft>
+                <a:spcPts val="600"/>
+              </a:spcAft>
+              <a:buClr>
+                <a:schemeClr val="accent2"/>
+              </a:buClr>
+              <a:buSzPct val="92000"/>
+              <a:buFont typeface="Wingdings 2" panose="05020102010507070707" pitchFamily="18" charset="2"/>
+              <a:buChar char=""/>
+              <a:defRPr sz="1400" kern="1200">
+                <a:solidFill>
+                  <a:schemeClr val="tx2"/>
+                </a:solidFill>
+                <a:latin typeface="+mn-lt"/>
+                <a:ea typeface="+mn-ea"/>
+                <a:cs typeface="+mn-cs"/>
+              </a:defRPr>
+            </a:lvl3pPr>
+            <a:lvl4pPr marL="1242000" indent="-234000" algn="l" defTabSz="457200" rtl="0" eaLnBrk="1" latinLnBrk="0" hangingPunct="1">
+              <a:spcBef>
+                <a:spcPct val="20000"/>
+              </a:spcBef>
+              <a:spcAft>
+                <a:spcPts val="600"/>
+              </a:spcAft>
+              <a:buClr>
+                <a:schemeClr val="accent2"/>
+              </a:buClr>
+              <a:buSzPct val="92000"/>
+              <a:buFont typeface="Wingdings 2" panose="05020102010507070707" pitchFamily="18" charset="2"/>
+              <a:buChar char=""/>
+              <a:defRPr sz="1200" kern="1200">
+                <a:solidFill>
+                  <a:schemeClr val="tx2"/>
+                </a:solidFill>
+                <a:latin typeface="+mn-lt"/>
+                <a:ea typeface="+mn-ea"/>
+                <a:cs typeface="+mn-cs"/>
+              </a:defRPr>
+            </a:lvl4pPr>
+            <a:lvl5pPr marL="1602000" indent="-234000" algn="l" defTabSz="457200" rtl="0" eaLnBrk="1" latinLnBrk="0" hangingPunct="1">
+              <a:spcBef>
+                <a:spcPct val="20000"/>
+              </a:spcBef>
+              <a:spcAft>
+                <a:spcPts val="600"/>
+              </a:spcAft>
+              <a:buClr>
+                <a:schemeClr val="accent2"/>
+              </a:buClr>
+              <a:buSzPct val="92000"/>
+              <a:buFont typeface="Wingdings 2" panose="05020102010507070707" pitchFamily="18" charset="2"/>
+              <a:buChar char=""/>
+              <a:defRPr sz="1200" kern="1200">
+                <a:solidFill>
+                  <a:schemeClr val="tx2"/>
+                </a:solidFill>
+                <a:latin typeface="+mn-lt"/>
+                <a:ea typeface="+mn-ea"/>
+                <a:cs typeface="+mn-cs"/>
+              </a:defRPr>
+            </a:lvl5pPr>
+            <a:lvl6pPr marL="1900000" indent="-228600" algn="l" defTabSz="457200" rtl="0" eaLnBrk="1" latinLnBrk="0" hangingPunct="1">
+              <a:spcBef>
+                <a:spcPct val="20000"/>
+              </a:spcBef>
+              <a:spcAft>
+                <a:spcPts val="600"/>
+              </a:spcAft>
+              <a:buClr>
+                <a:schemeClr val="accent2"/>
+              </a:buClr>
+              <a:buSzPct val="92000"/>
+              <a:buFont typeface="Wingdings 2" panose="05020102010507070707" pitchFamily="18" charset="2"/>
+              <a:buChar char=""/>
+              <a:defRPr sz="1200" kern="1200">
+                <a:solidFill>
+                  <a:schemeClr val="tx2"/>
+                </a:solidFill>
+                <a:latin typeface="+mn-lt"/>
+                <a:ea typeface="+mn-ea"/>
+                <a:cs typeface="+mn-cs"/>
+              </a:defRPr>
+            </a:lvl6pPr>
+            <a:lvl7pPr marL="2200000" indent="-228600" algn="l" defTabSz="457200" rtl="0" eaLnBrk="1" latinLnBrk="0" hangingPunct="1">
+              <a:spcBef>
+                <a:spcPct val="20000"/>
+              </a:spcBef>
+              <a:spcAft>
+                <a:spcPts val="600"/>
+              </a:spcAft>
+              <a:buClr>
+                <a:schemeClr val="accent2"/>
+              </a:buClr>
+              <a:buSzPct val="92000"/>
+              <a:buFont typeface="Wingdings 2" panose="05020102010507070707" pitchFamily="18" charset="2"/>
+              <a:buChar char=""/>
+              <a:defRPr sz="1200" kern="1200">
+                <a:solidFill>
+                  <a:schemeClr val="tx2"/>
+                </a:solidFill>
+                <a:latin typeface="+mn-lt"/>
+                <a:ea typeface="+mn-ea"/>
+                <a:cs typeface="+mn-cs"/>
+              </a:defRPr>
+            </a:lvl7pPr>
+            <a:lvl8pPr marL="2500000" indent="-228600" algn="l" defTabSz="457200" rtl="0" eaLnBrk="1" latinLnBrk="0" hangingPunct="1">
+              <a:spcBef>
+                <a:spcPct val="20000"/>
+              </a:spcBef>
+              <a:spcAft>
+                <a:spcPts val="600"/>
+              </a:spcAft>
+              <a:buClr>
+                <a:schemeClr val="accent2"/>
+              </a:buClr>
+              <a:buSzPct val="92000"/>
+              <a:buFont typeface="Wingdings 2" panose="05020102010507070707" pitchFamily="18" charset="2"/>
+              <a:buChar char=""/>
+              <a:defRPr sz="1200" kern="1200">
+                <a:solidFill>
+                  <a:schemeClr val="tx2"/>
+                </a:solidFill>
+                <a:latin typeface="+mn-lt"/>
+                <a:ea typeface="+mn-ea"/>
+                <a:cs typeface="+mn-cs"/>
+              </a:defRPr>
+            </a:lvl8pPr>
+            <a:lvl9pPr marL="2800000" indent="-228600" algn="l" defTabSz="457200" rtl="0" eaLnBrk="1" latinLnBrk="0" hangingPunct="1">
+              <a:spcBef>
+                <a:spcPct val="20000"/>
+              </a:spcBef>
+              <a:spcAft>
+                <a:spcPts val="600"/>
+              </a:spcAft>
+              <a:buClr>
+                <a:schemeClr val="accent2"/>
+              </a:buClr>
+              <a:buSzPct val="92000"/>
+              <a:buFont typeface="Wingdings 2" panose="05020102010507070707" pitchFamily="18" charset="2"/>
+              <a:buChar char=""/>
+              <a:defRPr sz="1200" kern="1200">
+                <a:solidFill>
+                  <a:schemeClr val="tx2"/>
+                </a:solidFill>
+                <a:latin typeface="+mn-lt"/>
+                <a:ea typeface="+mn-ea"/>
+                <a:cs typeface="+mn-cs"/>
+              </a:defRPr>
+            </a:lvl9pPr>
+          </a:lstStyle>
+          <a:p>
+            <a:pPr marL="0" indent="0">
+              <a:buNone/>
+            </a:pPr>
+            <a:r>
+              <a:rPr lang="en-US" sz="4800" b="1" dirty="0">
+                <a:solidFill>
+                  <a:schemeClr val="accent5">
+                    <a:lumMod val="20000"/>
+                    <a:lumOff val="80000"/>
+                  </a:schemeClr>
+                </a:solidFill>
+              </a:rPr>
+              <a:t>Live Demo!</a:t>
+            </a:r>
+            <a:endParaRPr lang="en-US" sz="4400" b="1" dirty="0">
+              <a:solidFill>
+                <a:schemeClr val="accent5">
+                  <a:lumMod val="20000"/>
+                  <a:lumOff val="80000"/>
+                </a:schemeClr>
+              </a:solidFill>
+            </a:endParaRPr>
+          </a:p>
+        </p:txBody>
+      </p:sp>
+      <p:pic>
+        <p:nvPicPr>
+          <p:cNvPr id="1026" name="Picture 2" descr="What is SQL Injection &amp; How to Prevent SQL Injection">
+            <a:extLst>
+              <a:ext uri="{FF2B5EF4-FFF2-40B4-BE49-F238E27FC236}">
+                <a16:creationId xmlns:a16="http://schemas.microsoft.com/office/drawing/2014/main" id="{466B5706-9019-32EC-0065-530746F4BBAF}"/>
+              </a:ext>
+            </a:extLst>
+          </p:cNvPr>
+          <p:cNvPicPr>
+            <a:picLocks noChangeAspect="1" noChangeArrowheads="1"/>
+          </p:cNvPicPr>
+          <p:nvPr/>
+        </p:nvPicPr>
+        <p:blipFill>
+          <a:blip r:embed="rId5">
+            <a:extLst>
+              <a:ext uri="{BEBA8EAE-BF5A-486C-A8C5-ECC9F3942E4B}">
+                <a14:imgProps xmlns:a14="http://schemas.microsoft.com/office/drawing/2010/main">
+                  <a14:imgLayer r:embed="rId6">
+                    <a14:imgEffect>
+                      <a14:backgroundRemoval t="5155" b="96649" l="2947" r="96857">
+                        <a14:foregroundMark x1="6876" y1="44072" x2="6876" y2="44072"/>
+                        <a14:foregroundMark x1="44990" y1="62629" x2="44990" y2="62629"/>
+                        <a14:foregroundMark x1="40864" y1="62629" x2="40864" y2="62629"/>
+                        <a14:foregroundMark x1="42436" y1="64175" x2="42436" y2="64175"/>
+                        <a14:foregroundMark x1="43615" y1="74485" x2="43615" y2="74485"/>
+                        <a14:foregroundMark x1="44990" y1="73969" x2="44990" y2="73969"/>
+                        <a14:foregroundMark x1="62475" y1="76546" x2="62475" y2="76546"/>
+                        <a14:foregroundMark x1="62083" y1="62113" x2="62083" y2="62113"/>
+                        <a14:foregroundMark x1="57367" y1="63144" x2="57367" y2="63144"/>
+                        <a14:foregroundMark x1="38703" y1="66753" x2="38703" y2="66753"/>
+                        <a14:foregroundMark x1="39293" y1="65722" x2="39293" y2="65722"/>
+                        <a14:foregroundMark x1="39293" y1="72165" x2="39293" y2="72165"/>
+                        <a14:foregroundMark x1="50688" y1="75000" x2="50688" y2="75000"/>
+                        <a14:foregroundMark x1="57564" y1="75773" x2="57564" y2="75773"/>
+                        <a14:foregroundMark x1="61493" y1="71134" x2="61493" y2="71134"/>
+                        <a14:foregroundMark x1="57957" y1="71134" x2="57957" y2="71134"/>
+                        <a14:foregroundMark x1="50295" y1="71134" x2="50295" y2="71134"/>
+                        <a14:foregroundMark x1="54028" y1="36598" x2="54028" y2="36598"/>
+                        <a14:foregroundMark x1="54028" y1="36598" x2="54028" y2="36598"/>
+                        <a14:foregroundMark x1="43222" y1="34794" x2="43222" y2="34794"/>
+                        <a14:foregroundMark x1="39882" y1="34536" x2="39882" y2="34536"/>
+                        <a14:foregroundMark x1="83694" y1="23711" x2="83694" y2="23711"/>
+                        <a14:foregroundMark x1="80157" y1="23711" x2="80157" y2="23711"/>
+                        <a14:foregroundMark x1="95088" y1="9536" x2="95088" y2="9536"/>
+                        <a14:foregroundMark x1="94303" y1="10309" x2="94303" y2="10309"/>
+                        <a14:foregroundMark x1="91552" y1="8505" x2="91552" y2="8505"/>
+                        <a14:foregroundMark x1="55206" y1="37629" x2="55206" y2="37629"/>
+                        <a14:foregroundMark x1="81139" y1="23969" x2="81139" y2="23969"/>
+                        <a14:foregroundMark x1="88409" y1="14175" x2="88409" y2="14175"/>
+                        <a14:foregroundMark x1="2947" y1="30670" x2="2947" y2="30670"/>
+                        <a14:foregroundMark x1="54617" y1="35825" x2="54617" y2="35825"/>
+                        <a14:foregroundMark x1="64440" y1="36856" x2="64440" y2="36856"/>
+                        <a14:foregroundMark x1="57957" y1="35052" x2="57957" y2="35052"/>
+                        <a14:foregroundMark x1="40275" y1="37113" x2="40275" y2="37113"/>
+                        <a14:foregroundMark x1="90766" y1="11082" x2="90766" y2="11082"/>
+                        <a14:foregroundMark x1="88605" y1="16237" x2="88605" y2="16237"/>
+                        <a14:foregroundMark x1="44204" y1="35052" x2="62083" y2="35309"/>
+                        <a14:foregroundMark x1="62083" y1="35309" x2="62083" y2="35309"/>
+                        <a14:foregroundMark x1="35756" y1="88918" x2="35756" y2="88918"/>
+                        <a14:foregroundMark x1="30648" y1="88918" x2="38114" y2="92268"/>
+                        <a14:foregroundMark x1="26719" y1="96134" x2="44204" y2="96134"/>
+                        <a14:foregroundMark x1="24165" y1="96134" x2="24165" y2="96134"/>
+                        <a14:foregroundMark x1="46169" y1="96134" x2="46169" y2="96134"/>
+                        <a14:foregroundMark x1="48723" y1="95619" x2="48723" y2="95619"/>
+                        <a14:foregroundMark x1="46955" y1="94845" x2="46955" y2="94845"/>
+                        <a14:foregroundMark x1="22790" y1="95361" x2="22790" y2="95361"/>
+                        <a14:foregroundMark x1="22004" y1="95361" x2="22004" y2="95361"/>
+                        <a14:foregroundMark x1="90570" y1="5670" x2="97053" y2="13918"/>
+                        <a14:foregroundMark x1="22593" y1="95876" x2="31041" y2="95103"/>
+                        <a14:foregroundMark x1="48673" y1="94640" x2="49312" y2="94588"/>
+                        <a14:foregroundMark x1="46179" y1="94845" x2="48244" y2="94676"/>
+                        <a14:foregroundMark x1="43026" y1="95103" x2="46179" y2="94845"/>
+                        <a14:foregroundMark x1="48919" y1="95876" x2="48919" y2="95876"/>
+                        <a14:foregroundMark x1="21807" y1="94588" x2="21807" y2="94588"/>
+                        <a14:foregroundMark x1="22004" y1="96649" x2="22004" y2="96649"/>
+                        <a14:foregroundMark x1="21611" y1="95876" x2="21611" y2="95876"/>
+                        <a14:foregroundMark x1="47741" y1="96649" x2="47741" y2="96649"/>
+                        <a14:foregroundMark x1="48527" y1="95876" x2="48527" y2="95876"/>
+                        <a14:backgroundMark x1="48723" y1="95876" x2="48723" y2="94845"/>
+                        <a14:backgroundMark x1="48723" y1="96649" x2="48723" y2="95876"/>
+                        <a14:backgroundMark x1="49509" y1="94845" x2="49509" y2="94845"/>
+                        <a14:backgroundMark x1="49116" y1="94588" x2="49116" y2="94588"/>
+                      </a14:backgroundRemoval>
+                    </a14:imgEffect>
+                  </a14:imgLayer>
+                </a14:imgProps>
+              </a:ext>
+              <a:ext uri="{28A0092B-C50C-407E-A947-70E740481C1C}">
+                <a14:useLocalDpi xmlns:a14="http://schemas.microsoft.com/office/drawing/2010/main" val="0"/>
+              </a:ext>
+            </a:extLst>
+          </a:blip>
+          <a:srcRect/>
+          <a:stretch>
+            <a:fillRect/>
+          </a:stretch>
+        </p:blipFill>
+        <p:spPr bwMode="auto">
+          <a:xfrm>
+            <a:off x="8221313" y="3429000"/>
+            <a:ext cx="3970687" cy="3026771"/>
+          </a:xfrm>
+          <a:prstGeom prst="rect">
+            <a:avLst/>
+          </a:prstGeom>
+          <a:noFill/>
+          <a:extLst>
+            <a:ext uri="{909E8E84-426E-40DD-AFC4-6F175D3DCCD1}">
+              <a14:hiddenFill xmlns:a14="http://schemas.microsoft.com/office/drawing/2010/main">
+                <a:solidFill>
+                  <a:srgbClr val="FFFFFF"/>
+                </a:solidFill>
+              </a14:hiddenFill>
+            </a:ext>
+          </a:extLst>
+        </p:spPr>
+      </p:pic>
+    </p:spTree>
+    <p:extLst>
+      <p:ext uri="{BB962C8B-B14F-4D97-AF65-F5344CB8AC3E}">
+        <p14:creationId xmlns:p14="http://schemas.microsoft.com/office/powerpoint/2010/main" val="498341741"/>
       </p:ext>
     </p:extLst>
   </p:cSld>

</xml_diff>